<commit_message>
Added abstract and conlcusion to draft
</commit_message>
<xml_diff>
--- a/data/Defense_Presentation.pptx
+++ b/data/Defense_Presentation.pptx
@@ -53,17 +53,18 @@
     <p:sldId id="308" r:id="rId47"/>
     <p:sldId id="286" r:id="rId48"/>
     <p:sldId id="325" r:id="rId49"/>
-    <p:sldId id="301" r:id="rId50"/>
-    <p:sldId id="331" r:id="rId51"/>
-    <p:sldId id="326" r:id="rId52"/>
-    <p:sldId id="327" r:id="rId53"/>
-    <p:sldId id="328" r:id="rId54"/>
-    <p:sldId id="329" r:id="rId55"/>
-    <p:sldId id="302" r:id="rId56"/>
-    <p:sldId id="333" r:id="rId57"/>
-    <p:sldId id="340" r:id="rId58"/>
-    <p:sldId id="341" r:id="rId59"/>
-    <p:sldId id="297" r:id="rId60"/>
+    <p:sldId id="329" r:id="rId50"/>
+    <p:sldId id="327" r:id="rId51"/>
+    <p:sldId id="302" r:id="rId52"/>
+    <p:sldId id="333" r:id="rId53"/>
+    <p:sldId id="340" r:id="rId54"/>
+    <p:sldId id="341" r:id="rId55"/>
+    <p:sldId id="297" r:id="rId56"/>
+    <p:sldId id="342" r:id="rId57"/>
+    <p:sldId id="301" r:id="rId58"/>
+    <p:sldId id="331" r:id="rId59"/>
+    <p:sldId id="326" r:id="rId60"/>
+    <p:sldId id="328" r:id="rId61"/>
   </p:sldIdLst>
   <p:sldSz cx="9144000" cy="6858000" type="screen4x3"/>
   <p:notesSz cx="6858000" cy="9144000"/>
@@ -185,8 +186,8 @@
 <pc:chgInfo xmlns:a="http://schemas.openxmlformats.org/drawingml/2006/main" xmlns:r="http://schemas.openxmlformats.org/officeDocument/2006/relationships" xmlns:ac="http://schemas.microsoft.com/office/drawing/2013/main/command" xmlns:pc="http://schemas.microsoft.com/office/powerpoint/2013/main/command">
   <pc:docChgLst>
     <pc:chgData name="Josh Ruff" userId="e19a6e02c34e67b4" providerId="LiveId" clId="{857B87E5-8DE9-4E24-854E-070C00D36702}"/>
-    <pc:docChg chg="custSel modSld">
-      <pc:chgData name="Josh Ruff" userId="e19a6e02c34e67b4" providerId="LiveId" clId="{857B87E5-8DE9-4E24-854E-070C00D36702}" dt="2019-03-02T01:59:38.861" v="459" actId="1076"/>
+    <pc:docChg chg="custSel addSld delSld modSld sldOrd">
+      <pc:chgData name="Josh Ruff" userId="e19a6e02c34e67b4" providerId="LiveId" clId="{857B87E5-8DE9-4E24-854E-070C00D36702}" dt="2019-03-05T07:33:16.133" v="605" actId="20577"/>
       <pc:docMkLst>
         <pc:docMk/>
       </pc:docMkLst>
@@ -202,6 +203,21 @@
             <pc:docMk/>
             <pc:sldMk cId="2314175290" sldId="259"/>
             <ac:spMk id="6" creationId="{00000000-0000-0000-0000-000000000000}"/>
+          </ac:spMkLst>
+        </pc:spChg>
+      </pc:sldChg>
+      <pc:sldChg chg="modSp">
+        <pc:chgData name="Josh Ruff" userId="e19a6e02c34e67b4" providerId="LiveId" clId="{857B87E5-8DE9-4E24-854E-070C00D36702}" dt="2019-03-05T07:08:41.401" v="582" actId="20577"/>
+        <pc:sldMkLst>
+          <pc:docMk/>
+          <pc:sldMk cId="1742997337" sldId="264"/>
+        </pc:sldMkLst>
+        <pc:spChg chg="mod">
+          <ac:chgData name="Josh Ruff" userId="e19a6e02c34e67b4" providerId="LiveId" clId="{857B87E5-8DE9-4E24-854E-070C00D36702}" dt="2019-03-05T07:08:41.401" v="582" actId="20577"/>
+          <ac:spMkLst>
+            <pc:docMk/>
+            <pc:sldMk cId="1742997337" sldId="264"/>
+            <ac:spMk id="5" creationId="{00000000-0000-0000-0000-000000000000}"/>
           </ac:spMkLst>
         </pc:spChg>
       </pc:sldChg>
@@ -225,6 +241,21 @@
             <pc:docMk/>
             <pc:sldMk cId="2797347569" sldId="265"/>
             <ac:spMk id="14" creationId="{E3A56BEB-53B6-4350-9AD1-35B7DF3169B5}"/>
+          </ac:spMkLst>
+        </pc:spChg>
+      </pc:sldChg>
+      <pc:sldChg chg="modSp">
+        <pc:chgData name="Josh Ruff" userId="e19a6e02c34e67b4" providerId="LiveId" clId="{857B87E5-8DE9-4E24-854E-070C00D36702}" dt="2019-03-05T07:33:16.133" v="605" actId="20577"/>
+        <pc:sldMkLst>
+          <pc:docMk/>
+          <pc:sldMk cId="317629910" sldId="270"/>
+        </pc:sldMkLst>
+        <pc:spChg chg="mod">
+          <ac:chgData name="Josh Ruff" userId="e19a6e02c34e67b4" providerId="LiveId" clId="{857B87E5-8DE9-4E24-854E-070C00D36702}" dt="2019-03-05T07:33:16.133" v="605" actId="20577"/>
+          <ac:spMkLst>
+            <pc:docMk/>
+            <pc:sldMk cId="317629910" sldId="270"/>
+            <ac:spMk id="8" creationId="{77655432-DFE5-4C42-88AC-C9CD98A67344}"/>
           </ac:spMkLst>
         </pc:spChg>
       </pc:sldChg>
@@ -258,6 +289,28 @@
             <ac:picMk id="24" creationId="{4F248258-D8AC-413D-985F-D2C875AED605}"/>
           </ac:picMkLst>
         </pc:picChg>
+      </pc:sldChg>
+      <pc:sldChg chg="modSp">
+        <pc:chgData name="Josh Ruff" userId="e19a6e02c34e67b4" providerId="LiveId" clId="{857B87E5-8DE9-4E24-854E-070C00D36702}" dt="2019-03-04T02:25:26.222" v="562" actId="20577"/>
+        <pc:sldMkLst>
+          <pc:docMk/>
+          <pc:sldMk cId="3689123858" sldId="297"/>
+        </pc:sldMkLst>
+        <pc:spChg chg="mod">
+          <ac:chgData name="Josh Ruff" userId="e19a6e02c34e67b4" providerId="LiveId" clId="{857B87E5-8DE9-4E24-854E-070C00D36702}" dt="2019-03-04T02:25:26.222" v="562" actId="20577"/>
+          <ac:spMkLst>
+            <pc:docMk/>
+            <pc:sldMk cId="3689123858" sldId="297"/>
+            <ac:spMk id="3" creationId="{A54A97F6-EDE3-4101-85EA-6F63328E9CCC}"/>
+          </ac:spMkLst>
+        </pc:spChg>
+      </pc:sldChg>
+      <pc:sldChg chg="ord">
+        <pc:chgData name="Josh Ruff" userId="e19a6e02c34e67b4" providerId="LiveId" clId="{857B87E5-8DE9-4E24-854E-070C00D36702}" dt="2019-03-03T04:08:35.690" v="534"/>
+        <pc:sldMkLst>
+          <pc:docMk/>
+          <pc:sldMk cId="4058572010" sldId="301"/>
+        </pc:sldMkLst>
       </pc:sldChg>
       <pc:sldChg chg="addSp delSp modSp">
         <pc:chgData name="Josh Ruff" userId="e19a6e02c34e67b4" providerId="LiveId" clId="{857B87E5-8DE9-4E24-854E-070C00D36702}" dt="2019-03-02T01:54:15.167" v="437" actId="14100"/>
@@ -352,6 +405,42 @@
           </ac:picMkLst>
         </pc:picChg>
       </pc:sldChg>
+      <pc:sldChg chg="ord">
+        <pc:chgData name="Josh Ruff" userId="e19a6e02c34e67b4" providerId="LiveId" clId="{857B87E5-8DE9-4E24-854E-070C00D36702}" dt="2019-03-03T04:08:46.980" v="535"/>
+        <pc:sldMkLst>
+          <pc:docMk/>
+          <pc:sldMk cId="1480663454" sldId="326"/>
+        </pc:sldMkLst>
+      </pc:sldChg>
+      <pc:sldChg chg="ord">
+        <pc:chgData name="Josh Ruff" userId="e19a6e02c34e67b4" providerId="LiveId" clId="{857B87E5-8DE9-4E24-854E-070C00D36702}" dt="2019-03-03T04:08:46.980" v="535"/>
+        <pc:sldMkLst>
+          <pc:docMk/>
+          <pc:sldMk cId="1913628093" sldId="328"/>
+        </pc:sldMkLst>
+      </pc:sldChg>
+      <pc:sldChg chg="modSp ord">
+        <pc:chgData name="Josh Ruff" userId="e19a6e02c34e67b4" providerId="LiveId" clId="{857B87E5-8DE9-4E24-854E-070C00D36702}" dt="2019-03-03T04:08:25.919" v="533" actId="20577"/>
+        <pc:sldMkLst>
+          <pc:docMk/>
+          <pc:sldMk cId="2975763781" sldId="329"/>
+        </pc:sldMkLst>
+        <pc:spChg chg="mod">
+          <ac:chgData name="Josh Ruff" userId="e19a6e02c34e67b4" providerId="LiveId" clId="{857B87E5-8DE9-4E24-854E-070C00D36702}" dt="2019-03-03T04:08:25.919" v="533" actId="20577"/>
+          <ac:spMkLst>
+            <pc:docMk/>
+            <pc:sldMk cId="2975763781" sldId="329"/>
+            <ac:spMk id="13" creationId="{E427AF26-0199-4C36-BEBD-98D0CF434499}"/>
+          </ac:spMkLst>
+        </pc:spChg>
+      </pc:sldChg>
+      <pc:sldChg chg="ord">
+        <pc:chgData name="Josh Ruff" userId="e19a6e02c34e67b4" providerId="LiveId" clId="{857B87E5-8DE9-4E24-854E-070C00D36702}" dt="2019-03-03T04:08:35.690" v="534"/>
+        <pc:sldMkLst>
+          <pc:docMk/>
+          <pc:sldMk cId="3647468134" sldId="331"/>
+        </pc:sldMkLst>
+      </pc:sldChg>
       <pc:sldChg chg="modSp">
         <pc:chgData name="Josh Ruff" userId="e19a6e02c34e67b4" providerId="LiveId" clId="{857B87E5-8DE9-4E24-854E-070C00D36702}" dt="2019-03-01T22:03:13.106" v="201" actId="20577"/>
         <pc:sldMkLst>
@@ -378,6 +467,21 @@
           <ac:spMkLst>
             <pc:docMk/>
             <pc:sldMk cId="2246278622" sldId="336"/>
+            <ac:spMk id="6" creationId="{00000000-0000-0000-0000-000000000000}"/>
+          </ac:spMkLst>
+        </pc:spChg>
+      </pc:sldChg>
+      <pc:sldChg chg="modSp add">
+        <pc:chgData name="Josh Ruff" userId="e19a6e02c34e67b4" providerId="LiveId" clId="{857B87E5-8DE9-4E24-854E-070C00D36702}" dt="2019-03-03T04:09:14.201" v="561" actId="20577"/>
+        <pc:sldMkLst>
+          <pc:docMk/>
+          <pc:sldMk cId="1656932729" sldId="342"/>
+        </pc:sldMkLst>
+        <pc:spChg chg="mod">
+          <ac:chgData name="Josh Ruff" userId="e19a6e02c34e67b4" providerId="LiveId" clId="{857B87E5-8DE9-4E24-854E-070C00D36702}" dt="2019-03-03T04:09:14.201" v="561" actId="20577"/>
+          <ac:spMkLst>
+            <pc:docMk/>
+            <pc:sldMk cId="1656932729" sldId="342"/>
             <ac:spMk id="6" creationId="{00000000-0000-0000-0000-000000000000}"/>
           </ac:spMkLst>
         </pc:spChg>
@@ -3049,7 +3153,7 @@
           <a:p>
             <a:fld id="{897839AE-C1B5-4240-BE46-F9D67336AD52}" type="datetimeFigureOut">
               <a:rPr lang="en-US" smtClean="0"/>
-              <a:t>2/28/2019</a:t>
+              <a:t>3/5/2019</a:t>
             </a:fld>
             <a:endParaRPr lang="en-US"/>
           </a:p>
@@ -6211,7 +6315,7 @@
           <a:p>
             <a:r>
               <a:rPr lang="en-US" dirty="0"/>
-              <a:t>ODL implements altitude simulator </a:t>
+              <a:t>Optical delay line implements altitude simulator </a:t>
             </a:r>
           </a:p>
           <a:p>
@@ -16977,1269 +17081,6 @@
 </file>
 
 <file path=ppt/slides/slide49.xml><?xml version="1.0" encoding="utf-8"?>
-<p:sld xmlns:a="http://schemas.openxmlformats.org/drawingml/2006/main" xmlns:r="http://schemas.openxmlformats.org/officeDocument/2006/relationships" xmlns:p="http://schemas.openxmlformats.org/presentationml/2006/main">
-  <p:cSld>
-    <p:spTree>
-      <p:nvGrpSpPr>
-        <p:cNvPr id="1" name=""/>
-        <p:cNvGrpSpPr/>
-        <p:nvPr/>
-      </p:nvGrpSpPr>
-      <p:grpSpPr>
-        <a:xfrm>
-          <a:off x="0" y="0"/>
-          <a:ext cx="0" cy="0"/>
-          <a:chOff x="0" y="0"/>
-          <a:chExt cx="0" cy="0"/>
-        </a:xfrm>
-      </p:grpSpPr>
-      <p:sp>
-        <p:nvSpPr>
-          <p:cNvPr id="2" name="Title 1">
-            <a:extLst>
-              <a:ext uri="{FF2B5EF4-FFF2-40B4-BE49-F238E27FC236}">
-                <a16:creationId xmlns:a16="http://schemas.microsoft.com/office/drawing/2014/main" id="{8BAFCB3B-FCA3-462A-A303-8BDB171EE8EA}"/>
-              </a:ext>
-            </a:extLst>
-          </p:cNvPr>
-          <p:cNvSpPr>
-            <a:spLocks noGrp="1"/>
-          </p:cNvSpPr>
-          <p:nvPr>
-            <p:ph type="title"/>
-          </p:nvPr>
-        </p:nvSpPr>
-        <p:spPr/>
-        <p:txBody>
-          <a:bodyPr/>
-          <a:lstStyle/>
-          <a:p>
-            <a:r>
-              <a:rPr lang="en-US" dirty="0"/>
-              <a:t>Radio Altimeter Tolerance of WAIC Systems</a:t>
-            </a:r>
-          </a:p>
-        </p:txBody>
-      </p:sp>
-      <p:sp>
-        <p:nvSpPr>
-          <p:cNvPr id="4" name="Text Placeholder 3">
-            <a:extLst>
-              <a:ext uri="{FF2B5EF4-FFF2-40B4-BE49-F238E27FC236}">
-                <a16:creationId xmlns:a16="http://schemas.microsoft.com/office/drawing/2014/main" id="{F662931B-701D-488B-B6AE-5BEDE8A83B51}"/>
-              </a:ext>
-            </a:extLst>
-          </p:cNvPr>
-          <p:cNvSpPr>
-            <a:spLocks noGrp="1"/>
-          </p:cNvSpPr>
-          <p:nvPr>
-            <p:ph type="body" sz="quarter" idx="10"/>
-          </p:nvPr>
-        </p:nvSpPr>
-        <p:spPr/>
-        <p:txBody>
-          <a:bodyPr/>
-          <a:lstStyle/>
-          <a:p>
-            <a:r>
-              <a:rPr lang="en-US" dirty="0"/>
-              <a:t>‘In Band’ WAIC Tests</a:t>
-            </a:r>
-          </a:p>
-        </p:txBody>
-      </p:sp>
-      <p:sp>
-        <p:nvSpPr>
-          <p:cNvPr id="5" name="Text Placeholder 4">
-            <a:extLst>
-              <a:ext uri="{FF2B5EF4-FFF2-40B4-BE49-F238E27FC236}">
-                <a16:creationId xmlns:a16="http://schemas.microsoft.com/office/drawing/2014/main" id="{061DAB52-3E86-4605-8E4F-22B6F84F8088}"/>
-              </a:ext>
-            </a:extLst>
-          </p:cNvPr>
-          <p:cNvSpPr>
-            <a:spLocks noGrp="1"/>
-          </p:cNvSpPr>
-          <p:nvPr>
-            <p:ph type="body" sz="quarter" idx="11"/>
-          </p:nvPr>
-        </p:nvSpPr>
-        <p:spPr/>
-        <p:txBody>
-          <a:bodyPr/>
-          <a:lstStyle/>
-          <a:p>
-            <a:r>
-              <a:rPr lang="en-US" dirty="0"/>
-              <a:t>Results – RA Type 1</a:t>
-            </a:r>
-          </a:p>
-        </p:txBody>
-      </p:sp>
-      <p:sp>
-        <p:nvSpPr>
-          <p:cNvPr id="6" name="Slide Number Placeholder 5">
-            <a:extLst>
-              <a:ext uri="{FF2B5EF4-FFF2-40B4-BE49-F238E27FC236}">
-                <a16:creationId xmlns:a16="http://schemas.microsoft.com/office/drawing/2014/main" id="{7A850062-377E-4031-ACE9-CE66F7BE723F}"/>
-              </a:ext>
-            </a:extLst>
-          </p:cNvPr>
-          <p:cNvSpPr>
-            <a:spLocks noGrp="1"/>
-          </p:cNvSpPr>
-          <p:nvPr>
-            <p:ph type="sldNum" sz="quarter" idx="4"/>
-          </p:nvPr>
-        </p:nvSpPr>
-        <p:spPr>
-          <a:xfrm>
-            <a:off x="5072514" y="6400942"/>
-            <a:ext cx="2133600" cy="365125"/>
-          </a:xfrm>
-          <a:prstGeom prst="rect">
-            <a:avLst/>
-          </a:prstGeom>
-        </p:spPr>
-        <p:txBody>
-          <a:bodyPr vert="horz" lIns="91440" tIns="45720" rIns="91440" bIns="45720" rtlCol="0" anchor="ctr"/>
-          <a:lstStyle>
-            <a:lvl1pPr algn="r">
-              <a:defRPr sz="1400">
-                <a:solidFill>
-                  <a:schemeClr val="bg1"/>
-                </a:solidFill>
-              </a:defRPr>
-            </a:lvl1pPr>
-          </a:lstStyle>
-          <a:p>
-            <a:fld id="{A23448E3-F972-4314-BEF2-440ABE63D998}" type="slidenum">
-              <a:rPr lang="en-US" b="1" smtClean="0">
-                <a:solidFill>
-                  <a:srgbClr val="FFFFFF"/>
-                </a:solidFill>
-              </a:rPr>
-              <a:pPr/>
-              <a:t>49</a:t>
-            </a:fld>
-            <a:endParaRPr lang="en-US" b="1" dirty="0">
-              <a:solidFill>
-                <a:srgbClr val="FFFFFF"/>
-              </a:solidFill>
-            </a:endParaRPr>
-          </a:p>
-        </p:txBody>
-      </p:sp>
-      <p:pic>
-        <p:nvPicPr>
-          <p:cNvPr id="8" name="Content Placeholder 7" descr="https://members.avsi.aero/projects/AFE76s1/labtest/ERT%20530%20500%20ft/100dB%20VCO%20200MHz%20Long%20Power%202nd%20waveform/Stat%20Plot%20200%20MHz%20OFDM%20paper.png">
-            <a:extLst>
-              <a:ext uri="{FF2B5EF4-FFF2-40B4-BE49-F238E27FC236}">
-                <a16:creationId xmlns:a16="http://schemas.microsoft.com/office/drawing/2014/main" id="{C1CB8BDD-9374-4A96-8463-1668F721416C}"/>
-              </a:ext>
-            </a:extLst>
-          </p:cNvPr>
-          <p:cNvPicPr>
-            <a:picLocks noGrp="1"/>
-          </p:cNvPicPr>
-          <p:nvPr>
-            <p:ph idx="1"/>
-          </p:nvPr>
-        </p:nvPicPr>
-        <p:blipFill rotWithShape="1">
-          <a:blip r:embed="rId2" cstate="print">
-            <a:extLst>
-              <a:ext uri="{28A0092B-C50C-407E-A947-70E740481C1C}">
-                <a14:useLocalDpi xmlns:a14="http://schemas.microsoft.com/office/drawing/2010/main" val="0"/>
-              </a:ext>
-            </a:extLst>
-          </a:blip>
-          <a:srcRect l="7170" t="10441" r="7986" b="4783"/>
-          <a:stretch/>
-        </p:blipFill>
-        <p:spPr bwMode="auto">
-          <a:xfrm>
-            <a:off x="1066800" y="1642055"/>
-            <a:ext cx="6705601" cy="4627810"/>
-          </a:xfrm>
-          <a:prstGeom prst="rect">
-            <a:avLst/>
-          </a:prstGeom>
-          <a:noFill/>
-          <a:ln>
-            <a:noFill/>
-          </a:ln>
-        </p:spPr>
-      </p:pic>
-    </p:spTree>
-    <p:extLst>
-      <p:ext uri="{BB962C8B-B14F-4D97-AF65-F5344CB8AC3E}">
-        <p14:creationId xmlns:p14="http://schemas.microsoft.com/office/powerpoint/2010/main" val="4058572010"/>
-      </p:ext>
-    </p:extLst>
-  </p:cSld>
-  <p:clrMapOvr>
-    <a:masterClrMapping/>
-  </p:clrMapOvr>
-  <p:transition>
-    <p:fade/>
-  </p:transition>
-</p:sld>
-</file>
-
-<file path=ppt/slides/slide5.xml><?xml version="1.0" encoding="utf-8"?>
-<p:sld xmlns:a="http://schemas.openxmlformats.org/drawingml/2006/main" xmlns:r="http://schemas.openxmlformats.org/officeDocument/2006/relationships" xmlns:p="http://schemas.openxmlformats.org/presentationml/2006/main">
-  <p:cSld>
-    <p:spTree>
-      <p:nvGrpSpPr>
-        <p:cNvPr id="1" name=""/>
-        <p:cNvGrpSpPr/>
-        <p:nvPr/>
-      </p:nvGrpSpPr>
-      <p:grpSpPr>
-        <a:xfrm>
-          <a:off x="0" y="0"/>
-          <a:ext cx="0" cy="0"/>
-          <a:chOff x="0" y="0"/>
-          <a:chExt cx="0" cy="0"/>
-        </a:xfrm>
-      </p:grpSpPr>
-      <p:sp>
-        <p:nvSpPr>
-          <p:cNvPr id="2" name="Title 1"/>
-          <p:cNvSpPr>
-            <a:spLocks noGrp="1"/>
-          </p:cNvSpPr>
-          <p:nvPr>
-            <p:ph type="title"/>
-          </p:nvPr>
-        </p:nvSpPr>
-        <p:spPr/>
-        <p:txBody>
-          <a:bodyPr/>
-          <a:lstStyle/>
-          <a:p>
-            <a:r>
-              <a:rPr lang="en-US" dirty="0"/>
-              <a:t>Radio Altimeter Tolerance of WAIC Systems</a:t>
-            </a:r>
-          </a:p>
-        </p:txBody>
-      </p:sp>
-      <p:sp>
-        <p:nvSpPr>
-          <p:cNvPr id="6" name="Content Placeholder 5"/>
-          <p:cNvSpPr>
-            <a:spLocks noGrp="1"/>
-          </p:cNvSpPr>
-          <p:nvPr>
-            <p:ph idx="1"/>
-          </p:nvPr>
-        </p:nvSpPr>
-        <p:spPr/>
-        <p:txBody>
-          <a:bodyPr/>
-          <a:lstStyle/>
-          <a:p>
-            <a:r>
-              <a:rPr lang="en-US" dirty="0"/>
-              <a:t>Feasibility study found no insurmountable barriers </a:t>
-            </a:r>
-          </a:p>
-          <a:p>
-            <a:r>
-              <a:rPr lang="en-US" dirty="0"/>
-              <a:t>AVSI began effort to acquire spectrum in 2008</a:t>
-            </a:r>
-          </a:p>
-          <a:p>
-            <a:r>
-              <a:rPr lang="en-US" dirty="0"/>
-              <a:t>Effort to find suitable band spanned World Radio Conferences in 2012 and 2015 (WRC-12 and WRC-15)</a:t>
-            </a:r>
-          </a:p>
-          <a:p>
-            <a:pPr lvl="1"/>
-            <a:r>
-              <a:rPr lang="en-US" dirty="0"/>
-              <a:t>WAIC placed on agenda at WRC-12, studied candidate bands</a:t>
-            </a:r>
-          </a:p>
-          <a:p>
-            <a:pPr lvl="1"/>
-            <a:r>
-              <a:rPr lang="en-US" dirty="0"/>
-              <a:t>An allocation in the Radio Altimeter (4.2-4.4GHz) band was secured at WRC-15 </a:t>
-            </a:r>
-          </a:p>
-          <a:p>
-            <a:r>
-              <a:rPr lang="en-US" dirty="0"/>
-              <a:t>As a condition of allocation, WAIC had to develop international standards which ensured compatibility with radio altimeters</a:t>
-            </a:r>
-          </a:p>
-        </p:txBody>
-      </p:sp>
-      <p:sp>
-        <p:nvSpPr>
-          <p:cNvPr id="4" name="Text Placeholder 3"/>
-          <p:cNvSpPr>
-            <a:spLocks noGrp="1"/>
-          </p:cNvSpPr>
-          <p:nvPr>
-            <p:ph type="body" sz="quarter" idx="10"/>
-          </p:nvPr>
-        </p:nvSpPr>
-        <p:spPr/>
-        <p:txBody>
-          <a:bodyPr/>
-          <a:lstStyle/>
-          <a:p>
-            <a:r>
-              <a:rPr lang="en-US" dirty="0"/>
-              <a:t>Introduction</a:t>
-            </a:r>
-          </a:p>
-        </p:txBody>
-      </p:sp>
-      <p:sp>
-        <p:nvSpPr>
-          <p:cNvPr id="5" name="Text Placeholder 4"/>
-          <p:cNvSpPr>
-            <a:spLocks noGrp="1"/>
-          </p:cNvSpPr>
-          <p:nvPr>
-            <p:ph type="body" sz="quarter" idx="11"/>
-          </p:nvPr>
-        </p:nvSpPr>
-        <p:spPr/>
-        <p:txBody>
-          <a:bodyPr/>
-          <a:lstStyle/>
-          <a:p>
-            <a:r>
-              <a:rPr lang="en-US" dirty="0"/>
-              <a:t>History – Acquiring Spectrum</a:t>
-            </a:r>
-          </a:p>
-        </p:txBody>
-      </p:sp>
-      <p:sp>
-        <p:nvSpPr>
-          <p:cNvPr id="9" name="Slide Number Placeholder 5">
-            <a:extLst>
-              <a:ext uri="{FF2B5EF4-FFF2-40B4-BE49-F238E27FC236}">
-                <a16:creationId xmlns:a16="http://schemas.microsoft.com/office/drawing/2014/main" id="{2868AB61-0DF3-4CE2-9D6B-47A5B3FFBC5B}"/>
-              </a:ext>
-            </a:extLst>
-          </p:cNvPr>
-          <p:cNvSpPr>
-            <a:spLocks noGrp="1"/>
-          </p:cNvSpPr>
-          <p:nvPr>
-            <p:ph type="sldNum" sz="quarter" idx="4"/>
-          </p:nvPr>
-        </p:nvSpPr>
-        <p:spPr>
-          <a:prstGeom prst="rect">
-            <a:avLst/>
-          </a:prstGeom>
-        </p:spPr>
-        <p:txBody>
-          <a:bodyPr vert="horz" lIns="91440" tIns="45720" rIns="91440" bIns="45720" rtlCol="0" anchor="ctr"/>
-          <a:lstStyle>
-            <a:lvl1pPr algn="r">
-              <a:defRPr sz="1400">
-                <a:solidFill>
-                  <a:schemeClr val="bg1"/>
-                </a:solidFill>
-              </a:defRPr>
-            </a:lvl1pPr>
-          </a:lstStyle>
-          <a:p>
-            <a:fld id="{A23448E3-F972-4314-BEF2-440ABE63D998}" type="slidenum">
-              <a:rPr lang="en-US" b="1" smtClean="0">
-                <a:solidFill>
-                  <a:srgbClr val="FFFFFF"/>
-                </a:solidFill>
-              </a:rPr>
-              <a:pPr/>
-              <a:t>5</a:t>
-            </a:fld>
-            <a:endParaRPr lang="en-US" b="1" dirty="0">
-              <a:solidFill>
-                <a:srgbClr val="FFFFFF"/>
-              </a:solidFill>
-            </a:endParaRPr>
-          </a:p>
-        </p:txBody>
-      </p:sp>
-    </p:spTree>
-    <p:extLst>
-      <p:ext uri="{BB962C8B-B14F-4D97-AF65-F5344CB8AC3E}">
-        <p14:creationId xmlns:p14="http://schemas.microsoft.com/office/powerpoint/2010/main" val="2246278622"/>
-      </p:ext>
-    </p:extLst>
-  </p:cSld>
-  <p:clrMapOvr>
-    <a:masterClrMapping/>
-  </p:clrMapOvr>
-  <p:transition>
-    <p:fade/>
-  </p:transition>
-</p:sld>
-</file>
-
-<file path=ppt/slides/slide50.xml><?xml version="1.0" encoding="utf-8"?>
-<p:sld xmlns:a="http://schemas.openxmlformats.org/drawingml/2006/main" xmlns:r="http://schemas.openxmlformats.org/officeDocument/2006/relationships" xmlns:p="http://schemas.openxmlformats.org/presentationml/2006/main">
-  <p:cSld>
-    <p:spTree>
-      <p:nvGrpSpPr>
-        <p:cNvPr id="1" name=""/>
-        <p:cNvGrpSpPr/>
-        <p:nvPr/>
-      </p:nvGrpSpPr>
-      <p:grpSpPr>
-        <a:xfrm>
-          <a:off x="0" y="0"/>
-          <a:ext cx="0" cy="0"/>
-          <a:chOff x="0" y="0"/>
-          <a:chExt cx="0" cy="0"/>
-        </a:xfrm>
-      </p:grpSpPr>
-      <p:sp>
-        <p:nvSpPr>
-          <p:cNvPr id="2" name="Title 1">
-            <a:extLst>
-              <a:ext uri="{FF2B5EF4-FFF2-40B4-BE49-F238E27FC236}">
-                <a16:creationId xmlns:a16="http://schemas.microsoft.com/office/drawing/2014/main" id="{8BAFCB3B-FCA3-462A-A303-8BDB171EE8EA}"/>
-              </a:ext>
-            </a:extLst>
-          </p:cNvPr>
-          <p:cNvSpPr>
-            <a:spLocks noGrp="1"/>
-          </p:cNvSpPr>
-          <p:nvPr>
-            <p:ph type="title"/>
-          </p:nvPr>
-        </p:nvSpPr>
-        <p:spPr/>
-        <p:txBody>
-          <a:bodyPr/>
-          <a:lstStyle/>
-          <a:p>
-            <a:r>
-              <a:rPr lang="en-US" dirty="0"/>
-              <a:t>Radio Altimeter Tolerance of WAIC Systems</a:t>
-            </a:r>
-          </a:p>
-        </p:txBody>
-      </p:sp>
-      <p:sp>
-        <p:nvSpPr>
-          <p:cNvPr id="4" name="Text Placeholder 3">
-            <a:extLst>
-              <a:ext uri="{FF2B5EF4-FFF2-40B4-BE49-F238E27FC236}">
-                <a16:creationId xmlns:a16="http://schemas.microsoft.com/office/drawing/2014/main" id="{F662931B-701D-488B-B6AE-5BEDE8A83B51}"/>
-              </a:ext>
-            </a:extLst>
-          </p:cNvPr>
-          <p:cNvSpPr>
-            <a:spLocks noGrp="1"/>
-          </p:cNvSpPr>
-          <p:nvPr>
-            <p:ph type="body" sz="quarter" idx="10"/>
-          </p:nvPr>
-        </p:nvSpPr>
-        <p:spPr/>
-        <p:txBody>
-          <a:bodyPr/>
-          <a:lstStyle/>
-          <a:p>
-            <a:r>
-              <a:rPr lang="en-US" dirty="0"/>
-              <a:t>‘In Band’ WAIC Tests</a:t>
-            </a:r>
-          </a:p>
-        </p:txBody>
-      </p:sp>
-      <p:sp>
-        <p:nvSpPr>
-          <p:cNvPr id="5" name="Text Placeholder 4">
-            <a:extLst>
-              <a:ext uri="{FF2B5EF4-FFF2-40B4-BE49-F238E27FC236}">
-                <a16:creationId xmlns:a16="http://schemas.microsoft.com/office/drawing/2014/main" id="{061DAB52-3E86-4605-8E4F-22B6F84F8088}"/>
-              </a:ext>
-            </a:extLst>
-          </p:cNvPr>
-          <p:cNvSpPr>
-            <a:spLocks noGrp="1"/>
-          </p:cNvSpPr>
-          <p:nvPr>
-            <p:ph type="body" sz="quarter" idx="11"/>
-          </p:nvPr>
-        </p:nvSpPr>
-        <p:spPr/>
-        <p:txBody>
-          <a:bodyPr/>
-          <a:lstStyle/>
-          <a:p>
-            <a:r>
-              <a:rPr lang="en-US" dirty="0"/>
-              <a:t>Results – RA Type 2</a:t>
-            </a:r>
-          </a:p>
-        </p:txBody>
-      </p:sp>
-      <p:sp>
-        <p:nvSpPr>
-          <p:cNvPr id="6" name="Slide Number Placeholder 5">
-            <a:extLst>
-              <a:ext uri="{FF2B5EF4-FFF2-40B4-BE49-F238E27FC236}">
-                <a16:creationId xmlns:a16="http://schemas.microsoft.com/office/drawing/2014/main" id="{7A850062-377E-4031-ACE9-CE66F7BE723F}"/>
-              </a:ext>
-            </a:extLst>
-          </p:cNvPr>
-          <p:cNvSpPr>
-            <a:spLocks noGrp="1"/>
-          </p:cNvSpPr>
-          <p:nvPr>
-            <p:ph type="sldNum" sz="quarter" idx="4"/>
-          </p:nvPr>
-        </p:nvSpPr>
-        <p:spPr>
-          <a:xfrm>
-            <a:off x="5072514" y="6400942"/>
-            <a:ext cx="2133600" cy="365125"/>
-          </a:xfrm>
-          <a:prstGeom prst="rect">
-            <a:avLst/>
-          </a:prstGeom>
-        </p:spPr>
-        <p:txBody>
-          <a:bodyPr vert="horz" lIns="91440" tIns="45720" rIns="91440" bIns="45720" rtlCol="0" anchor="ctr"/>
-          <a:lstStyle>
-            <a:lvl1pPr algn="r">
-              <a:defRPr sz="1400">
-                <a:solidFill>
-                  <a:schemeClr val="bg1"/>
-                </a:solidFill>
-              </a:defRPr>
-            </a:lvl1pPr>
-          </a:lstStyle>
-          <a:p>
-            <a:fld id="{A23448E3-F972-4314-BEF2-440ABE63D998}" type="slidenum">
-              <a:rPr lang="en-US" b="1" smtClean="0">
-                <a:solidFill>
-                  <a:srgbClr val="FFFFFF"/>
-                </a:solidFill>
-              </a:rPr>
-              <a:pPr/>
-              <a:t>50</a:t>
-            </a:fld>
-            <a:endParaRPr lang="en-US" b="1" dirty="0">
-              <a:solidFill>
-                <a:srgbClr val="FFFFFF"/>
-              </a:solidFill>
-            </a:endParaRPr>
-          </a:p>
-        </p:txBody>
-      </p:sp>
-      <p:pic>
-        <p:nvPicPr>
-          <p:cNvPr id="9" name="Content Placeholder 8" descr="https://members.avsi.aero/projects/AFE76s1/labtest/ERT%20550%20500%20ft/100dB%20VCO%20200MHz%20Long%20Power%202nd%20Waveform/Stat%20Plot%20200%20MHz%20OFDM%20Paper.png">
-            <a:extLst>
-              <a:ext uri="{FF2B5EF4-FFF2-40B4-BE49-F238E27FC236}">
-                <a16:creationId xmlns:a16="http://schemas.microsoft.com/office/drawing/2014/main" id="{C91BDB8A-9ABC-4AB2-BD17-3ADB646EB2D8}"/>
-              </a:ext>
-            </a:extLst>
-          </p:cNvPr>
-          <p:cNvPicPr>
-            <a:picLocks noGrp="1"/>
-          </p:cNvPicPr>
-          <p:nvPr>
-            <p:ph idx="1"/>
-          </p:nvPr>
-        </p:nvPicPr>
-        <p:blipFill rotWithShape="1">
-          <a:blip r:embed="rId2" cstate="print">
-            <a:extLst>
-              <a:ext uri="{28A0092B-C50C-407E-A947-70E740481C1C}">
-                <a14:useLocalDpi xmlns:a14="http://schemas.microsoft.com/office/drawing/2010/main" val="0"/>
-              </a:ext>
-            </a:extLst>
-          </a:blip>
-          <a:srcRect l="6953" t="8091" r="6952" b="3793"/>
-          <a:stretch/>
-        </p:blipFill>
-        <p:spPr bwMode="auto">
-          <a:xfrm>
-            <a:off x="1257300" y="1621221"/>
-            <a:ext cx="6629400" cy="4686300"/>
-          </a:xfrm>
-          <a:prstGeom prst="rect">
-            <a:avLst/>
-          </a:prstGeom>
-          <a:noFill/>
-          <a:ln>
-            <a:noFill/>
-          </a:ln>
-        </p:spPr>
-      </p:pic>
-    </p:spTree>
-    <p:extLst>
-      <p:ext uri="{BB962C8B-B14F-4D97-AF65-F5344CB8AC3E}">
-        <p14:creationId xmlns:p14="http://schemas.microsoft.com/office/powerpoint/2010/main" val="3647468134"/>
-      </p:ext>
-    </p:extLst>
-  </p:cSld>
-  <p:clrMapOvr>
-    <a:masterClrMapping/>
-  </p:clrMapOvr>
-  <p:transition>
-    <p:fade/>
-  </p:transition>
-</p:sld>
-</file>
-
-<file path=ppt/slides/slide51.xml><?xml version="1.0" encoding="utf-8"?>
-<p:sld xmlns:a="http://schemas.openxmlformats.org/drawingml/2006/main" xmlns:r="http://schemas.openxmlformats.org/officeDocument/2006/relationships" xmlns:p="http://schemas.openxmlformats.org/presentationml/2006/main">
-  <p:cSld>
-    <p:spTree>
-      <p:nvGrpSpPr>
-        <p:cNvPr id="1" name=""/>
-        <p:cNvGrpSpPr/>
-        <p:nvPr/>
-      </p:nvGrpSpPr>
-      <p:grpSpPr>
-        <a:xfrm>
-          <a:off x="0" y="0"/>
-          <a:ext cx="0" cy="0"/>
-          <a:chOff x="0" y="0"/>
-          <a:chExt cx="0" cy="0"/>
-        </a:xfrm>
-      </p:grpSpPr>
-      <p:sp>
-        <p:nvSpPr>
-          <p:cNvPr id="2" name="Title 1">
-            <a:extLst>
-              <a:ext uri="{FF2B5EF4-FFF2-40B4-BE49-F238E27FC236}">
-                <a16:creationId xmlns:a16="http://schemas.microsoft.com/office/drawing/2014/main" id="{8BAFCB3B-FCA3-462A-A303-8BDB171EE8EA}"/>
-              </a:ext>
-            </a:extLst>
-          </p:cNvPr>
-          <p:cNvSpPr>
-            <a:spLocks noGrp="1"/>
-          </p:cNvSpPr>
-          <p:nvPr>
-            <p:ph type="title"/>
-          </p:nvPr>
-        </p:nvSpPr>
-        <p:spPr/>
-        <p:txBody>
-          <a:bodyPr/>
-          <a:lstStyle/>
-          <a:p>
-            <a:r>
-              <a:rPr lang="en-US" dirty="0"/>
-              <a:t>Radio Altimeter Tolerance of WAIC Systems</a:t>
-            </a:r>
-          </a:p>
-        </p:txBody>
-      </p:sp>
-      <p:sp>
-        <p:nvSpPr>
-          <p:cNvPr id="4" name="Text Placeholder 3">
-            <a:extLst>
-              <a:ext uri="{FF2B5EF4-FFF2-40B4-BE49-F238E27FC236}">
-                <a16:creationId xmlns:a16="http://schemas.microsoft.com/office/drawing/2014/main" id="{F662931B-701D-488B-B6AE-5BEDE8A83B51}"/>
-              </a:ext>
-            </a:extLst>
-          </p:cNvPr>
-          <p:cNvSpPr>
-            <a:spLocks noGrp="1"/>
-          </p:cNvSpPr>
-          <p:nvPr>
-            <p:ph type="body" sz="quarter" idx="10"/>
-          </p:nvPr>
-        </p:nvSpPr>
-        <p:spPr/>
-        <p:txBody>
-          <a:bodyPr/>
-          <a:lstStyle/>
-          <a:p>
-            <a:r>
-              <a:rPr lang="en-US" dirty="0"/>
-              <a:t>‘In Band’ WAIC Tests</a:t>
-            </a:r>
-          </a:p>
-        </p:txBody>
-      </p:sp>
-      <p:sp>
-        <p:nvSpPr>
-          <p:cNvPr id="5" name="Text Placeholder 4">
-            <a:extLst>
-              <a:ext uri="{FF2B5EF4-FFF2-40B4-BE49-F238E27FC236}">
-                <a16:creationId xmlns:a16="http://schemas.microsoft.com/office/drawing/2014/main" id="{061DAB52-3E86-4605-8E4F-22B6F84F8088}"/>
-              </a:ext>
-            </a:extLst>
-          </p:cNvPr>
-          <p:cNvSpPr>
-            <a:spLocks noGrp="1"/>
-          </p:cNvSpPr>
-          <p:nvPr>
-            <p:ph type="body" sz="quarter" idx="11"/>
-          </p:nvPr>
-        </p:nvSpPr>
-        <p:spPr/>
-        <p:txBody>
-          <a:bodyPr/>
-          <a:lstStyle/>
-          <a:p>
-            <a:r>
-              <a:rPr lang="en-US" dirty="0"/>
-              <a:t>Results – RA Type 3</a:t>
-            </a:r>
-          </a:p>
-        </p:txBody>
-      </p:sp>
-      <p:sp>
-        <p:nvSpPr>
-          <p:cNvPr id="6" name="Slide Number Placeholder 5">
-            <a:extLst>
-              <a:ext uri="{FF2B5EF4-FFF2-40B4-BE49-F238E27FC236}">
-                <a16:creationId xmlns:a16="http://schemas.microsoft.com/office/drawing/2014/main" id="{7A850062-377E-4031-ACE9-CE66F7BE723F}"/>
-              </a:ext>
-            </a:extLst>
-          </p:cNvPr>
-          <p:cNvSpPr>
-            <a:spLocks noGrp="1"/>
-          </p:cNvSpPr>
-          <p:nvPr>
-            <p:ph type="sldNum" sz="quarter" idx="4"/>
-          </p:nvPr>
-        </p:nvSpPr>
-        <p:spPr>
-          <a:xfrm>
-            <a:off x="5072514" y="6400942"/>
-            <a:ext cx="2133600" cy="365125"/>
-          </a:xfrm>
-          <a:prstGeom prst="rect">
-            <a:avLst/>
-          </a:prstGeom>
-        </p:spPr>
-        <p:txBody>
-          <a:bodyPr vert="horz" lIns="91440" tIns="45720" rIns="91440" bIns="45720" rtlCol="0" anchor="ctr"/>
-          <a:lstStyle>
-            <a:lvl1pPr algn="r">
-              <a:defRPr sz="1400">
-                <a:solidFill>
-                  <a:schemeClr val="bg1"/>
-                </a:solidFill>
-              </a:defRPr>
-            </a:lvl1pPr>
-          </a:lstStyle>
-          <a:p>
-            <a:fld id="{A23448E3-F972-4314-BEF2-440ABE63D998}" type="slidenum">
-              <a:rPr lang="en-US" b="1" smtClean="0">
-                <a:solidFill>
-                  <a:srgbClr val="FFFFFF"/>
-                </a:solidFill>
-              </a:rPr>
-              <a:pPr/>
-              <a:t>51</a:t>
-            </a:fld>
-            <a:endParaRPr lang="en-US" b="1" dirty="0">
-              <a:solidFill>
-                <a:srgbClr val="FFFFFF"/>
-              </a:solidFill>
-            </a:endParaRPr>
-          </a:p>
-        </p:txBody>
-      </p:sp>
-      <p:pic>
-        <p:nvPicPr>
-          <p:cNvPr id="10" name="Content Placeholder 9" descr="https://members.avsi.aero/projects/AFE76s1/labtest/LRA%20900%20500%20ft/100dB%20VCO%20200MHz%20Long%20Power%202nd%20waveform/Stat%20Plot%20200%20MHz%20OFDM%20paper.png">
-            <a:extLst>
-              <a:ext uri="{FF2B5EF4-FFF2-40B4-BE49-F238E27FC236}">
-                <a16:creationId xmlns:a16="http://schemas.microsoft.com/office/drawing/2014/main" id="{CCC76699-6EEF-414A-8CBC-38C3570468A4}"/>
-              </a:ext>
-            </a:extLst>
-          </p:cNvPr>
-          <p:cNvPicPr>
-            <a:picLocks noGrp="1"/>
-          </p:cNvPicPr>
-          <p:nvPr>
-            <p:ph idx="1"/>
-          </p:nvPr>
-        </p:nvPicPr>
-        <p:blipFill rotWithShape="1">
-          <a:blip r:embed="rId2" cstate="print">
-            <a:extLst>
-              <a:ext uri="{28A0092B-C50C-407E-A947-70E740481C1C}">
-                <a14:useLocalDpi xmlns:a14="http://schemas.microsoft.com/office/drawing/2010/main" val="0"/>
-              </a:ext>
-            </a:extLst>
-          </a:blip>
-          <a:srcRect l="6953" t="10240" r="8437" b="3792"/>
-          <a:stretch/>
-        </p:blipFill>
-        <p:spPr bwMode="auto">
-          <a:xfrm>
-            <a:off x="1219200" y="1597525"/>
-            <a:ext cx="6705600" cy="4705685"/>
-          </a:xfrm>
-          <a:prstGeom prst="rect">
-            <a:avLst/>
-          </a:prstGeom>
-          <a:noFill/>
-          <a:ln>
-            <a:noFill/>
-          </a:ln>
-        </p:spPr>
-      </p:pic>
-    </p:spTree>
-    <p:extLst>
-      <p:ext uri="{BB962C8B-B14F-4D97-AF65-F5344CB8AC3E}">
-        <p14:creationId xmlns:p14="http://schemas.microsoft.com/office/powerpoint/2010/main" val="1480663454"/>
-      </p:ext>
-    </p:extLst>
-  </p:cSld>
-  <p:clrMapOvr>
-    <a:masterClrMapping/>
-  </p:clrMapOvr>
-  <p:transition>
-    <p:fade/>
-  </p:transition>
-</p:sld>
-</file>
-
-<file path=ppt/slides/slide52.xml><?xml version="1.0" encoding="utf-8"?>
-<p:sld xmlns:a="http://schemas.openxmlformats.org/drawingml/2006/main" xmlns:r="http://schemas.openxmlformats.org/officeDocument/2006/relationships" xmlns:p="http://schemas.openxmlformats.org/presentationml/2006/main">
-  <p:cSld>
-    <p:spTree>
-      <p:nvGrpSpPr>
-        <p:cNvPr id="1" name=""/>
-        <p:cNvGrpSpPr/>
-        <p:nvPr/>
-      </p:nvGrpSpPr>
-      <p:grpSpPr>
-        <a:xfrm>
-          <a:off x="0" y="0"/>
-          <a:ext cx="0" cy="0"/>
-          <a:chOff x="0" y="0"/>
-          <a:chExt cx="0" cy="0"/>
-        </a:xfrm>
-      </p:grpSpPr>
-      <p:sp>
-        <p:nvSpPr>
-          <p:cNvPr id="2" name="Title 1">
-            <a:extLst>
-              <a:ext uri="{FF2B5EF4-FFF2-40B4-BE49-F238E27FC236}">
-                <a16:creationId xmlns:a16="http://schemas.microsoft.com/office/drawing/2014/main" id="{8BAFCB3B-FCA3-462A-A303-8BDB171EE8EA}"/>
-              </a:ext>
-            </a:extLst>
-          </p:cNvPr>
-          <p:cNvSpPr>
-            <a:spLocks noGrp="1"/>
-          </p:cNvSpPr>
-          <p:nvPr>
-            <p:ph type="title"/>
-          </p:nvPr>
-        </p:nvSpPr>
-        <p:spPr/>
-        <p:txBody>
-          <a:bodyPr/>
-          <a:lstStyle/>
-          <a:p>
-            <a:r>
-              <a:rPr lang="en-US" dirty="0"/>
-              <a:t>Radio Altimeter Tolerance of WAIC Systems</a:t>
-            </a:r>
-          </a:p>
-        </p:txBody>
-      </p:sp>
-      <p:sp>
-        <p:nvSpPr>
-          <p:cNvPr id="4" name="Text Placeholder 3">
-            <a:extLst>
-              <a:ext uri="{FF2B5EF4-FFF2-40B4-BE49-F238E27FC236}">
-                <a16:creationId xmlns:a16="http://schemas.microsoft.com/office/drawing/2014/main" id="{F662931B-701D-488B-B6AE-5BEDE8A83B51}"/>
-              </a:ext>
-            </a:extLst>
-          </p:cNvPr>
-          <p:cNvSpPr>
-            <a:spLocks noGrp="1"/>
-          </p:cNvSpPr>
-          <p:nvPr>
-            <p:ph type="body" sz="quarter" idx="10"/>
-          </p:nvPr>
-        </p:nvSpPr>
-        <p:spPr/>
-        <p:txBody>
-          <a:bodyPr/>
-          <a:lstStyle/>
-          <a:p>
-            <a:r>
-              <a:rPr lang="en-US" dirty="0"/>
-              <a:t>‘In Band’ WAIC Tests</a:t>
-            </a:r>
-          </a:p>
-        </p:txBody>
-      </p:sp>
-      <p:sp>
-        <p:nvSpPr>
-          <p:cNvPr id="5" name="Text Placeholder 4">
-            <a:extLst>
-              <a:ext uri="{FF2B5EF4-FFF2-40B4-BE49-F238E27FC236}">
-                <a16:creationId xmlns:a16="http://schemas.microsoft.com/office/drawing/2014/main" id="{061DAB52-3E86-4605-8E4F-22B6F84F8088}"/>
-              </a:ext>
-            </a:extLst>
-          </p:cNvPr>
-          <p:cNvSpPr>
-            <a:spLocks noGrp="1"/>
-          </p:cNvSpPr>
-          <p:nvPr>
-            <p:ph type="body" sz="quarter" idx="11"/>
-          </p:nvPr>
-        </p:nvSpPr>
-        <p:spPr/>
-        <p:txBody>
-          <a:bodyPr/>
-          <a:lstStyle/>
-          <a:p>
-            <a:r>
-              <a:rPr lang="en-US" dirty="0"/>
-              <a:t>Results – RA Type 4</a:t>
-            </a:r>
-          </a:p>
-        </p:txBody>
-      </p:sp>
-      <p:sp>
-        <p:nvSpPr>
-          <p:cNvPr id="6" name="Slide Number Placeholder 5">
-            <a:extLst>
-              <a:ext uri="{FF2B5EF4-FFF2-40B4-BE49-F238E27FC236}">
-                <a16:creationId xmlns:a16="http://schemas.microsoft.com/office/drawing/2014/main" id="{7A850062-377E-4031-ACE9-CE66F7BE723F}"/>
-              </a:ext>
-            </a:extLst>
-          </p:cNvPr>
-          <p:cNvSpPr>
-            <a:spLocks noGrp="1"/>
-          </p:cNvSpPr>
-          <p:nvPr>
-            <p:ph type="sldNum" sz="quarter" idx="4"/>
-          </p:nvPr>
-        </p:nvSpPr>
-        <p:spPr>
-          <a:xfrm>
-            <a:off x="5072514" y="6400942"/>
-            <a:ext cx="2133600" cy="365125"/>
-          </a:xfrm>
-          <a:prstGeom prst="rect">
-            <a:avLst/>
-          </a:prstGeom>
-        </p:spPr>
-        <p:txBody>
-          <a:bodyPr vert="horz" lIns="91440" tIns="45720" rIns="91440" bIns="45720" rtlCol="0" anchor="ctr"/>
-          <a:lstStyle>
-            <a:lvl1pPr algn="r">
-              <a:defRPr sz="1400">
-                <a:solidFill>
-                  <a:schemeClr val="bg1"/>
-                </a:solidFill>
-              </a:defRPr>
-            </a:lvl1pPr>
-          </a:lstStyle>
-          <a:p>
-            <a:fld id="{A23448E3-F972-4314-BEF2-440ABE63D998}" type="slidenum">
-              <a:rPr lang="en-US" b="1" smtClean="0">
-                <a:solidFill>
-                  <a:srgbClr val="FFFFFF"/>
-                </a:solidFill>
-              </a:rPr>
-              <a:pPr/>
-              <a:t>52</a:t>
-            </a:fld>
-            <a:endParaRPr lang="en-US" b="1" dirty="0">
-              <a:solidFill>
-                <a:srgbClr val="FFFFFF"/>
-              </a:solidFill>
-            </a:endParaRPr>
-          </a:p>
-        </p:txBody>
-      </p:sp>
-      <p:pic>
-        <p:nvPicPr>
-          <p:cNvPr id="9" name="Content Placeholder 8" descr="https://members.avsi.aero/projects/AFE76s1/labtest/LRA%202100%20500%20ft/100dB%20VCO%20200MHz%20Long%20Power%202nd%20waveform/Stat%20Plot%20200%20MHz%20OFDM%20paper.png">
-            <a:extLst>
-              <a:ext uri="{FF2B5EF4-FFF2-40B4-BE49-F238E27FC236}">
-                <a16:creationId xmlns:a16="http://schemas.microsoft.com/office/drawing/2014/main" id="{9C2E87CA-A162-4516-BBF2-FA609C909A84}"/>
-              </a:ext>
-            </a:extLst>
-          </p:cNvPr>
-          <p:cNvPicPr>
-            <a:picLocks noGrp="1"/>
-          </p:cNvPicPr>
-          <p:nvPr>
-            <p:ph idx="1"/>
-          </p:nvPr>
-        </p:nvPicPr>
-        <p:blipFill rotWithShape="1">
-          <a:blip r:embed="rId2" cstate="print">
-            <a:extLst>
-              <a:ext uri="{28A0092B-C50C-407E-A947-70E740481C1C}">
-                <a14:useLocalDpi xmlns:a14="http://schemas.microsoft.com/office/drawing/2010/main" val="0"/>
-              </a:ext>
-            </a:extLst>
-          </a:blip>
-          <a:srcRect l="6952" t="10240" r="8437" b="5942"/>
-          <a:stretch/>
-        </p:blipFill>
-        <p:spPr bwMode="auto">
-          <a:xfrm>
-            <a:off x="1216269" y="1676400"/>
-            <a:ext cx="6711462" cy="4592053"/>
-          </a:xfrm>
-          <a:prstGeom prst="rect">
-            <a:avLst/>
-          </a:prstGeom>
-          <a:noFill/>
-          <a:ln>
-            <a:noFill/>
-          </a:ln>
-        </p:spPr>
-      </p:pic>
-    </p:spTree>
-    <p:extLst>
-      <p:ext uri="{BB962C8B-B14F-4D97-AF65-F5344CB8AC3E}">
-        <p14:creationId xmlns:p14="http://schemas.microsoft.com/office/powerpoint/2010/main" val="2486609702"/>
-      </p:ext>
-    </p:extLst>
-  </p:cSld>
-  <p:clrMapOvr>
-    <a:masterClrMapping/>
-  </p:clrMapOvr>
-  <p:transition>
-    <p:fade/>
-  </p:transition>
-</p:sld>
-</file>
-
-<file path=ppt/slides/slide53.xml><?xml version="1.0" encoding="utf-8"?>
-<p:sld xmlns:a="http://schemas.openxmlformats.org/drawingml/2006/main" xmlns:r="http://schemas.openxmlformats.org/officeDocument/2006/relationships" xmlns:p="http://schemas.openxmlformats.org/presentationml/2006/main">
-  <p:cSld>
-    <p:spTree>
-      <p:nvGrpSpPr>
-        <p:cNvPr id="1" name=""/>
-        <p:cNvGrpSpPr/>
-        <p:nvPr/>
-      </p:nvGrpSpPr>
-      <p:grpSpPr>
-        <a:xfrm>
-          <a:off x="0" y="0"/>
-          <a:ext cx="0" cy="0"/>
-          <a:chOff x="0" y="0"/>
-          <a:chExt cx="0" cy="0"/>
-        </a:xfrm>
-      </p:grpSpPr>
-      <p:sp>
-        <p:nvSpPr>
-          <p:cNvPr id="2" name="Title 1">
-            <a:extLst>
-              <a:ext uri="{FF2B5EF4-FFF2-40B4-BE49-F238E27FC236}">
-                <a16:creationId xmlns:a16="http://schemas.microsoft.com/office/drawing/2014/main" id="{8BAFCB3B-FCA3-462A-A303-8BDB171EE8EA}"/>
-              </a:ext>
-            </a:extLst>
-          </p:cNvPr>
-          <p:cNvSpPr>
-            <a:spLocks noGrp="1"/>
-          </p:cNvSpPr>
-          <p:nvPr>
-            <p:ph type="title"/>
-          </p:nvPr>
-        </p:nvSpPr>
-        <p:spPr/>
-        <p:txBody>
-          <a:bodyPr/>
-          <a:lstStyle/>
-          <a:p>
-            <a:r>
-              <a:rPr lang="en-US" dirty="0"/>
-              <a:t>Radio Altimeter Tolerance of WAIC Systems</a:t>
-            </a:r>
-          </a:p>
-        </p:txBody>
-      </p:sp>
-      <p:sp>
-        <p:nvSpPr>
-          <p:cNvPr id="4" name="Text Placeholder 3">
-            <a:extLst>
-              <a:ext uri="{FF2B5EF4-FFF2-40B4-BE49-F238E27FC236}">
-                <a16:creationId xmlns:a16="http://schemas.microsoft.com/office/drawing/2014/main" id="{F662931B-701D-488B-B6AE-5BEDE8A83B51}"/>
-              </a:ext>
-            </a:extLst>
-          </p:cNvPr>
-          <p:cNvSpPr>
-            <a:spLocks noGrp="1"/>
-          </p:cNvSpPr>
-          <p:nvPr>
-            <p:ph type="body" sz="quarter" idx="10"/>
-          </p:nvPr>
-        </p:nvSpPr>
-        <p:spPr/>
-        <p:txBody>
-          <a:bodyPr/>
-          <a:lstStyle/>
-          <a:p>
-            <a:r>
-              <a:rPr lang="en-US" dirty="0"/>
-              <a:t>‘In Band’ WAIC Tests</a:t>
-            </a:r>
-          </a:p>
-        </p:txBody>
-      </p:sp>
-      <p:sp>
-        <p:nvSpPr>
-          <p:cNvPr id="5" name="Text Placeholder 4">
-            <a:extLst>
-              <a:ext uri="{FF2B5EF4-FFF2-40B4-BE49-F238E27FC236}">
-                <a16:creationId xmlns:a16="http://schemas.microsoft.com/office/drawing/2014/main" id="{061DAB52-3E86-4605-8E4F-22B6F84F8088}"/>
-              </a:ext>
-            </a:extLst>
-          </p:cNvPr>
-          <p:cNvSpPr>
-            <a:spLocks noGrp="1"/>
-          </p:cNvSpPr>
-          <p:nvPr>
-            <p:ph type="body" sz="quarter" idx="11"/>
-          </p:nvPr>
-        </p:nvSpPr>
-        <p:spPr/>
-        <p:txBody>
-          <a:bodyPr/>
-          <a:lstStyle/>
-          <a:p>
-            <a:r>
-              <a:rPr lang="en-US" dirty="0"/>
-              <a:t>Results – RA Type 5</a:t>
-            </a:r>
-          </a:p>
-        </p:txBody>
-      </p:sp>
-      <p:sp>
-        <p:nvSpPr>
-          <p:cNvPr id="6" name="Slide Number Placeholder 5">
-            <a:extLst>
-              <a:ext uri="{FF2B5EF4-FFF2-40B4-BE49-F238E27FC236}">
-                <a16:creationId xmlns:a16="http://schemas.microsoft.com/office/drawing/2014/main" id="{7A850062-377E-4031-ACE9-CE66F7BE723F}"/>
-              </a:ext>
-            </a:extLst>
-          </p:cNvPr>
-          <p:cNvSpPr>
-            <a:spLocks noGrp="1"/>
-          </p:cNvSpPr>
-          <p:nvPr>
-            <p:ph type="sldNum" sz="quarter" idx="4"/>
-          </p:nvPr>
-        </p:nvSpPr>
-        <p:spPr>
-          <a:xfrm>
-            <a:off x="5072514" y="6400942"/>
-            <a:ext cx="2133600" cy="365125"/>
-          </a:xfrm>
-          <a:prstGeom prst="rect">
-            <a:avLst/>
-          </a:prstGeom>
-        </p:spPr>
-        <p:txBody>
-          <a:bodyPr vert="horz" lIns="91440" tIns="45720" rIns="91440" bIns="45720" rtlCol="0" anchor="ctr"/>
-          <a:lstStyle>
-            <a:lvl1pPr algn="r">
-              <a:defRPr sz="1400">
-                <a:solidFill>
-                  <a:schemeClr val="bg1"/>
-                </a:solidFill>
-              </a:defRPr>
-            </a:lvl1pPr>
-          </a:lstStyle>
-          <a:p>
-            <a:fld id="{A23448E3-F972-4314-BEF2-440ABE63D998}" type="slidenum">
-              <a:rPr lang="en-US" b="1" smtClean="0">
-                <a:solidFill>
-                  <a:srgbClr val="FFFFFF"/>
-                </a:solidFill>
-              </a:rPr>
-              <a:pPr/>
-              <a:t>53</a:t>
-            </a:fld>
-            <a:endParaRPr lang="en-US" b="1" dirty="0">
-              <a:solidFill>
-                <a:srgbClr val="FFFFFF"/>
-              </a:solidFill>
-            </a:endParaRPr>
-          </a:p>
-        </p:txBody>
-      </p:sp>
-      <p:pic>
-        <p:nvPicPr>
-          <p:cNvPr id="8" name="Content Placeholder 7" descr="https://members.avsi.aero/projects/AFE76s1/labtest/ALA%2052B%20500%20ft/100dB%20VCO%20200MHz%20Long%20Power%202nd%20waveform/Stat%20Plot%20200%20MHz%20OFDM%20paper.png">
-            <a:extLst>
-              <a:ext uri="{FF2B5EF4-FFF2-40B4-BE49-F238E27FC236}">
-                <a16:creationId xmlns:a16="http://schemas.microsoft.com/office/drawing/2014/main" id="{210D798C-3637-455B-8E10-9F58DB54C30F}"/>
-              </a:ext>
-            </a:extLst>
-          </p:cNvPr>
-          <p:cNvPicPr>
-            <a:picLocks noGrp="1"/>
-          </p:cNvPicPr>
-          <p:nvPr>
-            <p:ph idx="1"/>
-          </p:nvPr>
-        </p:nvPicPr>
-        <p:blipFill rotWithShape="1">
-          <a:blip r:embed="rId2" cstate="print">
-            <a:extLst>
-              <a:ext uri="{28A0092B-C50C-407E-A947-70E740481C1C}">
-                <a14:useLocalDpi xmlns:a14="http://schemas.microsoft.com/office/drawing/2010/main" val="0"/>
-              </a:ext>
-            </a:extLst>
-          </a:blip>
-          <a:srcRect l="6953" t="10240" r="6953" b="3792"/>
-          <a:stretch/>
-        </p:blipFill>
-        <p:spPr bwMode="auto">
-          <a:xfrm>
-            <a:off x="1181100" y="1668517"/>
-            <a:ext cx="6781800" cy="4677104"/>
-          </a:xfrm>
-          <a:prstGeom prst="rect">
-            <a:avLst/>
-          </a:prstGeom>
-          <a:noFill/>
-          <a:ln>
-            <a:noFill/>
-          </a:ln>
-        </p:spPr>
-      </p:pic>
-    </p:spTree>
-    <p:extLst>
-      <p:ext uri="{BB962C8B-B14F-4D97-AF65-F5344CB8AC3E}">
-        <p14:creationId xmlns:p14="http://schemas.microsoft.com/office/powerpoint/2010/main" val="1913628093"/>
-      </p:ext>
-    </p:extLst>
-  </p:cSld>
-  <p:clrMapOvr>
-    <a:masterClrMapping/>
-  </p:clrMapOvr>
-  <p:transition>
-    <p:fade/>
-  </p:transition>
-</p:sld>
-</file>
-
-<file path=ppt/slides/slide54.xml><?xml version="1.0" encoding="utf-8"?>
 <p:sld xmlns:a="http://schemas.openxmlformats.org/drawingml/2006/main" xmlns:r="http://schemas.openxmlformats.org/officeDocument/2006/relationships" xmlns:p="http://schemas.openxmlformats.org/presentationml/2006/main">
   <p:cSld>
     <p:spTree>
@@ -18799,6 +17640,1071 @@
                 </a:solidFill>
               </a:rPr>
               <a:pPr/>
+              <a:t>49</a:t>
+            </a:fld>
+            <a:endParaRPr lang="en-US" b="1" dirty="0">
+              <a:solidFill>
+                <a:srgbClr val="FFFFFF"/>
+              </a:solidFill>
+            </a:endParaRPr>
+          </a:p>
+        </p:txBody>
+      </p:sp>
+      <p:sp>
+        <p:nvSpPr>
+          <p:cNvPr id="13" name="Content Placeholder 12">
+            <a:extLst>
+              <a:ext uri="{FF2B5EF4-FFF2-40B4-BE49-F238E27FC236}">
+                <a16:creationId xmlns:a16="http://schemas.microsoft.com/office/drawing/2014/main" id="{E427AF26-0199-4C36-BEBD-98D0CF434499}"/>
+              </a:ext>
+            </a:extLst>
+          </p:cNvPr>
+          <p:cNvSpPr>
+            <a:spLocks noGrp="1"/>
+          </p:cNvSpPr>
+          <p:nvPr>
+            <p:ph idx="12"/>
+          </p:nvPr>
+        </p:nvSpPr>
+        <p:spPr>
+          <a:xfrm>
+            <a:off x="990601" y="3429000"/>
+            <a:ext cx="7467599" cy="2590800"/>
+          </a:xfrm>
+        </p:spPr>
+        <p:txBody>
+          <a:bodyPr/>
+          <a:lstStyle/>
+          <a:p>
+            <a:r>
+              <a:rPr lang="en-US" dirty="0"/>
+              <a:t>Interference power levels above which reported altitude is impacted</a:t>
+            </a:r>
+          </a:p>
+        </p:txBody>
+      </p:sp>
+    </p:spTree>
+    <p:extLst>
+      <p:ext uri="{BB962C8B-B14F-4D97-AF65-F5344CB8AC3E}">
+        <p14:creationId xmlns:p14="http://schemas.microsoft.com/office/powerpoint/2010/main" val="2975763781"/>
+      </p:ext>
+    </p:extLst>
+  </p:cSld>
+  <p:clrMapOvr>
+    <a:masterClrMapping/>
+  </p:clrMapOvr>
+  <p:transition>
+    <p:fade/>
+  </p:transition>
+</p:sld>
+</file>
+
+<file path=ppt/slides/slide5.xml><?xml version="1.0" encoding="utf-8"?>
+<p:sld xmlns:a="http://schemas.openxmlformats.org/drawingml/2006/main" xmlns:r="http://schemas.openxmlformats.org/officeDocument/2006/relationships" xmlns:p="http://schemas.openxmlformats.org/presentationml/2006/main">
+  <p:cSld>
+    <p:spTree>
+      <p:nvGrpSpPr>
+        <p:cNvPr id="1" name=""/>
+        <p:cNvGrpSpPr/>
+        <p:nvPr/>
+      </p:nvGrpSpPr>
+      <p:grpSpPr>
+        <a:xfrm>
+          <a:off x="0" y="0"/>
+          <a:ext cx="0" cy="0"/>
+          <a:chOff x="0" y="0"/>
+          <a:chExt cx="0" cy="0"/>
+        </a:xfrm>
+      </p:grpSpPr>
+      <p:sp>
+        <p:nvSpPr>
+          <p:cNvPr id="2" name="Title 1"/>
+          <p:cNvSpPr>
+            <a:spLocks noGrp="1"/>
+          </p:cNvSpPr>
+          <p:nvPr>
+            <p:ph type="title"/>
+          </p:nvPr>
+        </p:nvSpPr>
+        <p:spPr/>
+        <p:txBody>
+          <a:bodyPr/>
+          <a:lstStyle/>
+          <a:p>
+            <a:r>
+              <a:rPr lang="en-US" dirty="0"/>
+              <a:t>Radio Altimeter Tolerance of WAIC Systems</a:t>
+            </a:r>
+          </a:p>
+        </p:txBody>
+      </p:sp>
+      <p:sp>
+        <p:nvSpPr>
+          <p:cNvPr id="6" name="Content Placeholder 5"/>
+          <p:cNvSpPr>
+            <a:spLocks noGrp="1"/>
+          </p:cNvSpPr>
+          <p:nvPr>
+            <p:ph idx="1"/>
+          </p:nvPr>
+        </p:nvSpPr>
+        <p:spPr/>
+        <p:txBody>
+          <a:bodyPr/>
+          <a:lstStyle/>
+          <a:p>
+            <a:r>
+              <a:rPr lang="en-US" dirty="0"/>
+              <a:t>Feasibility study found no insurmountable barriers </a:t>
+            </a:r>
+          </a:p>
+          <a:p>
+            <a:r>
+              <a:rPr lang="en-US" dirty="0"/>
+              <a:t>AVSI began effort to acquire spectrum in 2008</a:t>
+            </a:r>
+          </a:p>
+          <a:p>
+            <a:r>
+              <a:rPr lang="en-US" dirty="0"/>
+              <a:t>Effort to find suitable band spanned World Radio Conferences in 2012 and 2015 (WRC-12 and WRC-15)</a:t>
+            </a:r>
+          </a:p>
+          <a:p>
+            <a:pPr lvl="1"/>
+            <a:r>
+              <a:rPr lang="en-US" dirty="0"/>
+              <a:t>WAIC placed on agenda at WRC-12, studied candidate bands</a:t>
+            </a:r>
+          </a:p>
+          <a:p>
+            <a:pPr lvl="1"/>
+            <a:r>
+              <a:rPr lang="en-US" dirty="0"/>
+              <a:t>An allocation in the Radio Altimeter (4.2-4.4GHz) band was secured at WRC-15 </a:t>
+            </a:r>
+          </a:p>
+          <a:p>
+            <a:r>
+              <a:rPr lang="en-US" dirty="0"/>
+              <a:t>As a condition of allocation, WAIC had to develop international standards which ensured compatibility with radio altimeters</a:t>
+            </a:r>
+          </a:p>
+        </p:txBody>
+      </p:sp>
+      <p:sp>
+        <p:nvSpPr>
+          <p:cNvPr id="4" name="Text Placeholder 3"/>
+          <p:cNvSpPr>
+            <a:spLocks noGrp="1"/>
+          </p:cNvSpPr>
+          <p:nvPr>
+            <p:ph type="body" sz="quarter" idx="10"/>
+          </p:nvPr>
+        </p:nvSpPr>
+        <p:spPr/>
+        <p:txBody>
+          <a:bodyPr/>
+          <a:lstStyle/>
+          <a:p>
+            <a:r>
+              <a:rPr lang="en-US" dirty="0"/>
+              <a:t>Introduction</a:t>
+            </a:r>
+          </a:p>
+        </p:txBody>
+      </p:sp>
+      <p:sp>
+        <p:nvSpPr>
+          <p:cNvPr id="5" name="Text Placeholder 4"/>
+          <p:cNvSpPr>
+            <a:spLocks noGrp="1"/>
+          </p:cNvSpPr>
+          <p:nvPr>
+            <p:ph type="body" sz="quarter" idx="11"/>
+          </p:nvPr>
+        </p:nvSpPr>
+        <p:spPr/>
+        <p:txBody>
+          <a:bodyPr/>
+          <a:lstStyle/>
+          <a:p>
+            <a:r>
+              <a:rPr lang="en-US" dirty="0"/>
+              <a:t>History – Acquiring Spectrum</a:t>
+            </a:r>
+          </a:p>
+        </p:txBody>
+      </p:sp>
+      <p:sp>
+        <p:nvSpPr>
+          <p:cNvPr id="9" name="Slide Number Placeholder 5">
+            <a:extLst>
+              <a:ext uri="{FF2B5EF4-FFF2-40B4-BE49-F238E27FC236}">
+                <a16:creationId xmlns:a16="http://schemas.microsoft.com/office/drawing/2014/main" id="{2868AB61-0DF3-4CE2-9D6B-47A5B3FFBC5B}"/>
+              </a:ext>
+            </a:extLst>
+          </p:cNvPr>
+          <p:cNvSpPr>
+            <a:spLocks noGrp="1"/>
+          </p:cNvSpPr>
+          <p:nvPr>
+            <p:ph type="sldNum" sz="quarter" idx="4"/>
+          </p:nvPr>
+        </p:nvSpPr>
+        <p:spPr>
+          <a:prstGeom prst="rect">
+            <a:avLst/>
+          </a:prstGeom>
+        </p:spPr>
+        <p:txBody>
+          <a:bodyPr vert="horz" lIns="91440" tIns="45720" rIns="91440" bIns="45720" rtlCol="0" anchor="ctr"/>
+          <a:lstStyle>
+            <a:lvl1pPr algn="r">
+              <a:defRPr sz="1400">
+                <a:solidFill>
+                  <a:schemeClr val="bg1"/>
+                </a:solidFill>
+              </a:defRPr>
+            </a:lvl1pPr>
+          </a:lstStyle>
+          <a:p>
+            <a:fld id="{A23448E3-F972-4314-BEF2-440ABE63D998}" type="slidenum">
+              <a:rPr lang="en-US" b="1" smtClean="0">
+                <a:solidFill>
+                  <a:srgbClr val="FFFFFF"/>
+                </a:solidFill>
+              </a:rPr>
+              <a:pPr/>
+              <a:t>5</a:t>
+            </a:fld>
+            <a:endParaRPr lang="en-US" b="1" dirty="0">
+              <a:solidFill>
+                <a:srgbClr val="FFFFFF"/>
+              </a:solidFill>
+            </a:endParaRPr>
+          </a:p>
+        </p:txBody>
+      </p:sp>
+    </p:spTree>
+    <p:extLst>
+      <p:ext uri="{BB962C8B-B14F-4D97-AF65-F5344CB8AC3E}">
+        <p14:creationId xmlns:p14="http://schemas.microsoft.com/office/powerpoint/2010/main" val="2246278622"/>
+      </p:ext>
+    </p:extLst>
+  </p:cSld>
+  <p:clrMapOvr>
+    <a:masterClrMapping/>
+  </p:clrMapOvr>
+  <p:transition>
+    <p:fade/>
+  </p:transition>
+</p:sld>
+</file>
+
+<file path=ppt/slides/slide50.xml><?xml version="1.0" encoding="utf-8"?>
+<p:sld xmlns:a="http://schemas.openxmlformats.org/drawingml/2006/main" xmlns:r="http://schemas.openxmlformats.org/officeDocument/2006/relationships" xmlns:p="http://schemas.openxmlformats.org/presentationml/2006/main">
+  <p:cSld>
+    <p:spTree>
+      <p:nvGrpSpPr>
+        <p:cNvPr id="1" name=""/>
+        <p:cNvGrpSpPr/>
+        <p:nvPr/>
+      </p:nvGrpSpPr>
+      <p:grpSpPr>
+        <a:xfrm>
+          <a:off x="0" y="0"/>
+          <a:ext cx="0" cy="0"/>
+          <a:chOff x="0" y="0"/>
+          <a:chExt cx="0" cy="0"/>
+        </a:xfrm>
+      </p:grpSpPr>
+      <p:sp>
+        <p:nvSpPr>
+          <p:cNvPr id="2" name="Title 1">
+            <a:extLst>
+              <a:ext uri="{FF2B5EF4-FFF2-40B4-BE49-F238E27FC236}">
+                <a16:creationId xmlns:a16="http://schemas.microsoft.com/office/drawing/2014/main" id="{8BAFCB3B-FCA3-462A-A303-8BDB171EE8EA}"/>
+              </a:ext>
+            </a:extLst>
+          </p:cNvPr>
+          <p:cNvSpPr>
+            <a:spLocks noGrp="1"/>
+          </p:cNvSpPr>
+          <p:nvPr>
+            <p:ph type="title"/>
+          </p:nvPr>
+        </p:nvSpPr>
+        <p:spPr/>
+        <p:txBody>
+          <a:bodyPr/>
+          <a:lstStyle/>
+          <a:p>
+            <a:r>
+              <a:rPr lang="en-US" dirty="0"/>
+              <a:t>Radio Altimeter Tolerance of WAIC Systems</a:t>
+            </a:r>
+          </a:p>
+        </p:txBody>
+      </p:sp>
+      <p:sp>
+        <p:nvSpPr>
+          <p:cNvPr id="4" name="Text Placeholder 3">
+            <a:extLst>
+              <a:ext uri="{FF2B5EF4-FFF2-40B4-BE49-F238E27FC236}">
+                <a16:creationId xmlns:a16="http://schemas.microsoft.com/office/drawing/2014/main" id="{F662931B-701D-488B-B6AE-5BEDE8A83B51}"/>
+              </a:ext>
+            </a:extLst>
+          </p:cNvPr>
+          <p:cNvSpPr>
+            <a:spLocks noGrp="1"/>
+          </p:cNvSpPr>
+          <p:nvPr>
+            <p:ph type="body" sz="quarter" idx="10"/>
+          </p:nvPr>
+        </p:nvSpPr>
+        <p:spPr/>
+        <p:txBody>
+          <a:bodyPr/>
+          <a:lstStyle/>
+          <a:p>
+            <a:r>
+              <a:rPr lang="en-US" dirty="0"/>
+              <a:t>‘In Band’ WAIC Tests</a:t>
+            </a:r>
+          </a:p>
+        </p:txBody>
+      </p:sp>
+      <p:sp>
+        <p:nvSpPr>
+          <p:cNvPr id="5" name="Text Placeholder 4">
+            <a:extLst>
+              <a:ext uri="{FF2B5EF4-FFF2-40B4-BE49-F238E27FC236}">
+                <a16:creationId xmlns:a16="http://schemas.microsoft.com/office/drawing/2014/main" id="{061DAB52-3E86-4605-8E4F-22B6F84F8088}"/>
+              </a:ext>
+            </a:extLst>
+          </p:cNvPr>
+          <p:cNvSpPr>
+            <a:spLocks noGrp="1"/>
+          </p:cNvSpPr>
+          <p:nvPr>
+            <p:ph type="body" sz="quarter" idx="11"/>
+          </p:nvPr>
+        </p:nvSpPr>
+        <p:spPr/>
+        <p:txBody>
+          <a:bodyPr/>
+          <a:lstStyle/>
+          <a:p>
+            <a:r>
+              <a:rPr lang="en-US" dirty="0"/>
+              <a:t>Results – RA Type 4</a:t>
+            </a:r>
+          </a:p>
+        </p:txBody>
+      </p:sp>
+      <p:sp>
+        <p:nvSpPr>
+          <p:cNvPr id="6" name="Slide Number Placeholder 5">
+            <a:extLst>
+              <a:ext uri="{FF2B5EF4-FFF2-40B4-BE49-F238E27FC236}">
+                <a16:creationId xmlns:a16="http://schemas.microsoft.com/office/drawing/2014/main" id="{7A850062-377E-4031-ACE9-CE66F7BE723F}"/>
+              </a:ext>
+            </a:extLst>
+          </p:cNvPr>
+          <p:cNvSpPr>
+            <a:spLocks noGrp="1"/>
+          </p:cNvSpPr>
+          <p:nvPr>
+            <p:ph type="sldNum" sz="quarter" idx="4"/>
+          </p:nvPr>
+        </p:nvSpPr>
+        <p:spPr>
+          <a:xfrm>
+            <a:off x="5072514" y="6400942"/>
+            <a:ext cx="2133600" cy="365125"/>
+          </a:xfrm>
+          <a:prstGeom prst="rect">
+            <a:avLst/>
+          </a:prstGeom>
+        </p:spPr>
+        <p:txBody>
+          <a:bodyPr vert="horz" lIns="91440" tIns="45720" rIns="91440" bIns="45720" rtlCol="0" anchor="ctr"/>
+          <a:lstStyle>
+            <a:lvl1pPr algn="r">
+              <a:defRPr sz="1400">
+                <a:solidFill>
+                  <a:schemeClr val="bg1"/>
+                </a:solidFill>
+              </a:defRPr>
+            </a:lvl1pPr>
+          </a:lstStyle>
+          <a:p>
+            <a:fld id="{A23448E3-F972-4314-BEF2-440ABE63D998}" type="slidenum">
+              <a:rPr lang="en-US" b="1" smtClean="0">
+                <a:solidFill>
+                  <a:srgbClr val="FFFFFF"/>
+                </a:solidFill>
+              </a:rPr>
+              <a:pPr/>
+              <a:t>50</a:t>
+            </a:fld>
+            <a:endParaRPr lang="en-US" b="1" dirty="0">
+              <a:solidFill>
+                <a:srgbClr val="FFFFFF"/>
+              </a:solidFill>
+            </a:endParaRPr>
+          </a:p>
+        </p:txBody>
+      </p:sp>
+      <p:pic>
+        <p:nvPicPr>
+          <p:cNvPr id="9" name="Content Placeholder 8" descr="https://members.avsi.aero/projects/AFE76s1/labtest/LRA%202100%20500%20ft/100dB%20VCO%20200MHz%20Long%20Power%202nd%20waveform/Stat%20Plot%20200%20MHz%20OFDM%20paper.png">
+            <a:extLst>
+              <a:ext uri="{FF2B5EF4-FFF2-40B4-BE49-F238E27FC236}">
+                <a16:creationId xmlns:a16="http://schemas.microsoft.com/office/drawing/2014/main" id="{9C2E87CA-A162-4516-BBF2-FA609C909A84}"/>
+              </a:ext>
+            </a:extLst>
+          </p:cNvPr>
+          <p:cNvPicPr>
+            <a:picLocks noGrp="1"/>
+          </p:cNvPicPr>
+          <p:nvPr>
+            <p:ph idx="1"/>
+          </p:nvPr>
+        </p:nvPicPr>
+        <p:blipFill rotWithShape="1">
+          <a:blip r:embed="rId2" cstate="print">
+            <a:extLst>
+              <a:ext uri="{28A0092B-C50C-407E-A947-70E740481C1C}">
+                <a14:useLocalDpi xmlns:a14="http://schemas.microsoft.com/office/drawing/2010/main" val="0"/>
+              </a:ext>
+            </a:extLst>
+          </a:blip>
+          <a:srcRect l="6952" t="10240" r="8437" b="5942"/>
+          <a:stretch/>
+        </p:blipFill>
+        <p:spPr bwMode="auto">
+          <a:xfrm>
+            <a:off x="1216269" y="1676400"/>
+            <a:ext cx="6711462" cy="4592053"/>
+          </a:xfrm>
+          <a:prstGeom prst="rect">
+            <a:avLst/>
+          </a:prstGeom>
+          <a:noFill/>
+          <a:ln>
+            <a:noFill/>
+          </a:ln>
+        </p:spPr>
+      </p:pic>
+    </p:spTree>
+    <p:extLst>
+      <p:ext uri="{BB962C8B-B14F-4D97-AF65-F5344CB8AC3E}">
+        <p14:creationId xmlns:p14="http://schemas.microsoft.com/office/powerpoint/2010/main" val="2486609702"/>
+      </p:ext>
+    </p:extLst>
+  </p:cSld>
+  <p:clrMapOvr>
+    <a:masterClrMapping/>
+  </p:clrMapOvr>
+  <p:transition>
+    <p:fade/>
+  </p:transition>
+</p:sld>
+</file>
+
+<file path=ppt/slides/slide51.xml><?xml version="1.0" encoding="utf-8"?>
+<p:sld xmlns:a="http://schemas.openxmlformats.org/drawingml/2006/main" xmlns:r="http://schemas.openxmlformats.org/officeDocument/2006/relationships" xmlns:p="http://schemas.openxmlformats.org/presentationml/2006/main">
+  <p:cSld>
+    <p:spTree>
+      <p:nvGrpSpPr>
+        <p:cNvPr id="1" name=""/>
+        <p:cNvGrpSpPr/>
+        <p:nvPr/>
+      </p:nvGrpSpPr>
+      <p:grpSpPr>
+        <a:xfrm>
+          <a:off x="0" y="0"/>
+          <a:ext cx="0" cy="0"/>
+          <a:chOff x="0" y="0"/>
+          <a:chExt cx="0" cy="0"/>
+        </a:xfrm>
+      </p:grpSpPr>
+      <p:sp>
+        <p:nvSpPr>
+          <p:cNvPr id="6" name="Title 5"/>
+          <p:cNvSpPr>
+            <a:spLocks noGrp="1"/>
+          </p:cNvSpPr>
+          <p:nvPr>
+            <p:ph type="title"/>
+          </p:nvPr>
+        </p:nvSpPr>
+        <p:spPr/>
+        <p:txBody>
+          <a:bodyPr/>
+          <a:lstStyle/>
+          <a:p>
+            <a:r>
+              <a:rPr lang="en-US" dirty="0"/>
+              <a:t>‘Out of Band’ WAIC Test Results</a:t>
+            </a:r>
+          </a:p>
+        </p:txBody>
+      </p:sp>
+      <p:sp>
+        <p:nvSpPr>
+          <p:cNvPr id="7" name="Text Placeholder 6"/>
+          <p:cNvSpPr>
+            <a:spLocks noGrp="1"/>
+          </p:cNvSpPr>
+          <p:nvPr>
+            <p:ph type="body" idx="1"/>
+          </p:nvPr>
+        </p:nvSpPr>
+        <p:spPr/>
+        <p:txBody>
+          <a:bodyPr/>
+          <a:lstStyle/>
+          <a:p>
+            <a:endParaRPr lang="en-US"/>
+          </a:p>
+        </p:txBody>
+      </p:sp>
+      <p:sp>
+        <p:nvSpPr>
+          <p:cNvPr id="4" name="Slide Number Placeholder 5">
+            <a:extLst>
+              <a:ext uri="{FF2B5EF4-FFF2-40B4-BE49-F238E27FC236}">
+                <a16:creationId xmlns:a16="http://schemas.microsoft.com/office/drawing/2014/main" id="{10E136A7-23FE-4AEA-AB8B-D10D98BC186B}"/>
+              </a:ext>
+            </a:extLst>
+          </p:cNvPr>
+          <p:cNvSpPr>
+            <a:spLocks noGrp="1"/>
+          </p:cNvSpPr>
+          <p:nvPr>
+            <p:ph type="sldNum" sz="quarter" idx="4"/>
+          </p:nvPr>
+        </p:nvSpPr>
+        <p:spPr>
+          <a:xfrm>
+            <a:off x="5072514" y="6400942"/>
+            <a:ext cx="2133600" cy="365125"/>
+          </a:xfrm>
+          <a:prstGeom prst="rect">
+            <a:avLst/>
+          </a:prstGeom>
+        </p:spPr>
+        <p:txBody>
+          <a:bodyPr vert="horz" lIns="91440" tIns="45720" rIns="91440" bIns="45720" rtlCol="0" anchor="ctr"/>
+          <a:lstStyle>
+            <a:lvl1pPr algn="r">
+              <a:defRPr sz="1400">
+                <a:solidFill>
+                  <a:schemeClr val="bg1"/>
+                </a:solidFill>
+              </a:defRPr>
+            </a:lvl1pPr>
+          </a:lstStyle>
+          <a:p>
+            <a:fld id="{A23448E3-F972-4314-BEF2-440ABE63D998}" type="slidenum">
+              <a:rPr lang="en-US" b="1" smtClean="0">
+                <a:solidFill>
+                  <a:srgbClr val="FFFFFF"/>
+                </a:solidFill>
+              </a:rPr>
+              <a:pPr/>
+              <a:t>51</a:t>
+            </a:fld>
+            <a:endParaRPr lang="en-US" b="1" dirty="0">
+              <a:solidFill>
+                <a:srgbClr val="FFFFFF"/>
+              </a:solidFill>
+            </a:endParaRPr>
+          </a:p>
+        </p:txBody>
+      </p:sp>
+    </p:spTree>
+    <p:extLst>
+      <p:ext uri="{BB962C8B-B14F-4D97-AF65-F5344CB8AC3E}">
+        <p14:creationId xmlns:p14="http://schemas.microsoft.com/office/powerpoint/2010/main" val="1606341070"/>
+      </p:ext>
+    </p:extLst>
+  </p:cSld>
+  <p:clrMapOvr>
+    <a:masterClrMapping/>
+  </p:clrMapOvr>
+</p:sld>
+</file>
+
+<file path=ppt/slides/slide52.xml><?xml version="1.0" encoding="utf-8"?>
+<p:sld xmlns:a="http://schemas.openxmlformats.org/drawingml/2006/main" xmlns:r="http://schemas.openxmlformats.org/officeDocument/2006/relationships" xmlns:p="http://schemas.openxmlformats.org/presentationml/2006/main">
+  <p:cSld>
+    <p:spTree>
+      <p:nvGrpSpPr>
+        <p:cNvPr id="1" name=""/>
+        <p:cNvGrpSpPr/>
+        <p:nvPr/>
+      </p:nvGrpSpPr>
+      <p:grpSpPr>
+        <a:xfrm>
+          <a:off x="0" y="0"/>
+          <a:ext cx="0" cy="0"/>
+          <a:chOff x="0" y="0"/>
+          <a:chExt cx="0" cy="0"/>
+        </a:xfrm>
+      </p:grpSpPr>
+      <p:sp>
+        <p:nvSpPr>
+          <p:cNvPr id="2" name="Title 1">
+            <a:extLst>
+              <a:ext uri="{FF2B5EF4-FFF2-40B4-BE49-F238E27FC236}">
+                <a16:creationId xmlns:a16="http://schemas.microsoft.com/office/drawing/2014/main" id="{8BAFCB3B-FCA3-462A-A303-8BDB171EE8EA}"/>
+              </a:ext>
+            </a:extLst>
+          </p:cNvPr>
+          <p:cNvSpPr>
+            <a:spLocks noGrp="1"/>
+          </p:cNvSpPr>
+          <p:nvPr>
+            <p:ph type="title"/>
+          </p:nvPr>
+        </p:nvSpPr>
+        <p:spPr/>
+        <p:txBody>
+          <a:bodyPr/>
+          <a:lstStyle/>
+          <a:p>
+            <a:r>
+              <a:rPr lang="en-US" dirty="0"/>
+              <a:t>Radio Altimeter Tolerance of WAIC Systems</a:t>
+            </a:r>
+          </a:p>
+        </p:txBody>
+      </p:sp>
+      <p:sp>
+        <p:nvSpPr>
+          <p:cNvPr id="4" name="Text Placeholder 3">
+            <a:extLst>
+              <a:ext uri="{FF2B5EF4-FFF2-40B4-BE49-F238E27FC236}">
+                <a16:creationId xmlns:a16="http://schemas.microsoft.com/office/drawing/2014/main" id="{F662931B-701D-488B-B6AE-5BEDE8A83B51}"/>
+              </a:ext>
+            </a:extLst>
+          </p:cNvPr>
+          <p:cNvSpPr>
+            <a:spLocks noGrp="1"/>
+          </p:cNvSpPr>
+          <p:nvPr>
+            <p:ph type="body" sz="quarter" idx="10"/>
+          </p:nvPr>
+        </p:nvSpPr>
+        <p:spPr/>
+        <p:txBody>
+          <a:bodyPr/>
+          <a:lstStyle/>
+          <a:p>
+            <a:r>
+              <a:rPr lang="en-US" dirty="0"/>
+              <a:t>‘Out of Band’ WAIC Tests</a:t>
+            </a:r>
+          </a:p>
+        </p:txBody>
+      </p:sp>
+      <p:sp>
+        <p:nvSpPr>
+          <p:cNvPr id="5" name="Text Placeholder 4">
+            <a:extLst>
+              <a:ext uri="{FF2B5EF4-FFF2-40B4-BE49-F238E27FC236}">
+                <a16:creationId xmlns:a16="http://schemas.microsoft.com/office/drawing/2014/main" id="{061DAB52-3E86-4605-8E4F-22B6F84F8088}"/>
+              </a:ext>
+            </a:extLst>
+          </p:cNvPr>
+          <p:cNvSpPr>
+            <a:spLocks noGrp="1"/>
+          </p:cNvSpPr>
+          <p:nvPr>
+            <p:ph type="body" sz="quarter" idx="11"/>
+          </p:nvPr>
+        </p:nvSpPr>
+        <p:spPr/>
+        <p:txBody>
+          <a:bodyPr/>
+          <a:lstStyle/>
+          <a:p>
+            <a:r>
+              <a:rPr lang="en-US" dirty="0"/>
+              <a:t>Preliminary results here</a:t>
+            </a:r>
+          </a:p>
+        </p:txBody>
+      </p:sp>
+      <p:sp>
+        <p:nvSpPr>
+          <p:cNvPr id="6" name="Slide Number Placeholder 5">
+            <a:extLst>
+              <a:ext uri="{FF2B5EF4-FFF2-40B4-BE49-F238E27FC236}">
+                <a16:creationId xmlns:a16="http://schemas.microsoft.com/office/drawing/2014/main" id="{7A850062-377E-4031-ACE9-CE66F7BE723F}"/>
+              </a:ext>
+            </a:extLst>
+          </p:cNvPr>
+          <p:cNvSpPr>
+            <a:spLocks noGrp="1"/>
+          </p:cNvSpPr>
+          <p:nvPr>
+            <p:ph type="sldNum" sz="quarter" idx="4"/>
+          </p:nvPr>
+        </p:nvSpPr>
+        <p:spPr>
+          <a:xfrm>
+            <a:off x="5072514" y="6400942"/>
+            <a:ext cx="2133600" cy="365125"/>
+          </a:xfrm>
+          <a:prstGeom prst="rect">
+            <a:avLst/>
+          </a:prstGeom>
+        </p:spPr>
+        <p:txBody>
+          <a:bodyPr vert="horz" lIns="91440" tIns="45720" rIns="91440" bIns="45720" rtlCol="0" anchor="ctr"/>
+          <a:lstStyle>
+            <a:lvl1pPr algn="r">
+              <a:defRPr sz="1400">
+                <a:solidFill>
+                  <a:schemeClr val="bg1"/>
+                </a:solidFill>
+              </a:defRPr>
+            </a:lvl1pPr>
+          </a:lstStyle>
+          <a:p>
+            <a:fld id="{A23448E3-F972-4314-BEF2-440ABE63D998}" type="slidenum">
+              <a:rPr lang="en-US" b="1" smtClean="0">
+                <a:solidFill>
+                  <a:srgbClr val="FFFFFF"/>
+                </a:solidFill>
+              </a:rPr>
+              <a:pPr/>
+              <a:t>52</a:t>
+            </a:fld>
+            <a:endParaRPr lang="en-US" b="1" dirty="0">
+              <a:solidFill>
+                <a:srgbClr val="FFFFFF"/>
+              </a:solidFill>
+            </a:endParaRPr>
+          </a:p>
+        </p:txBody>
+      </p:sp>
+      <p:sp>
+        <p:nvSpPr>
+          <p:cNvPr id="10" name="Content Placeholder 9">
+            <a:extLst>
+              <a:ext uri="{FF2B5EF4-FFF2-40B4-BE49-F238E27FC236}">
+                <a16:creationId xmlns:a16="http://schemas.microsoft.com/office/drawing/2014/main" id="{E0965016-AA02-409D-A5F0-F2748B3CB904}"/>
+              </a:ext>
+            </a:extLst>
+          </p:cNvPr>
+          <p:cNvSpPr>
+            <a:spLocks noGrp="1"/>
+          </p:cNvSpPr>
+          <p:nvPr>
+            <p:ph idx="1"/>
+          </p:nvPr>
+        </p:nvSpPr>
+        <p:spPr/>
+        <p:txBody>
+          <a:bodyPr/>
+          <a:lstStyle/>
+          <a:p>
+            <a:endParaRPr lang="en-US" dirty="0"/>
+          </a:p>
+        </p:txBody>
+      </p:sp>
+    </p:spTree>
+    <p:extLst>
+      <p:ext uri="{BB962C8B-B14F-4D97-AF65-F5344CB8AC3E}">
+        <p14:creationId xmlns:p14="http://schemas.microsoft.com/office/powerpoint/2010/main" val="1025219883"/>
+      </p:ext>
+    </p:extLst>
+  </p:cSld>
+  <p:clrMapOvr>
+    <a:masterClrMapping/>
+  </p:clrMapOvr>
+  <p:transition>
+    <p:fade/>
+  </p:transition>
+</p:sld>
+</file>
+
+<file path=ppt/slides/slide53.xml><?xml version="1.0" encoding="utf-8"?>
+<p:sld xmlns:a="http://schemas.openxmlformats.org/drawingml/2006/main" xmlns:r="http://schemas.openxmlformats.org/officeDocument/2006/relationships" xmlns:p="http://schemas.openxmlformats.org/presentationml/2006/main">
+  <p:cSld>
+    <p:spTree>
+      <p:nvGrpSpPr>
+        <p:cNvPr id="1" name=""/>
+        <p:cNvGrpSpPr/>
+        <p:nvPr/>
+      </p:nvGrpSpPr>
+      <p:grpSpPr>
+        <a:xfrm>
+          <a:off x="0" y="0"/>
+          <a:ext cx="0" cy="0"/>
+          <a:chOff x="0" y="0"/>
+          <a:chExt cx="0" cy="0"/>
+        </a:xfrm>
+      </p:grpSpPr>
+      <p:sp>
+        <p:nvSpPr>
+          <p:cNvPr id="6" name="Title 5"/>
+          <p:cNvSpPr>
+            <a:spLocks noGrp="1"/>
+          </p:cNvSpPr>
+          <p:nvPr>
+            <p:ph type="title"/>
+          </p:nvPr>
+        </p:nvSpPr>
+        <p:spPr/>
+        <p:txBody>
+          <a:bodyPr/>
+          <a:lstStyle/>
+          <a:p>
+            <a:r>
+              <a:rPr lang="en-US" dirty="0"/>
+              <a:t>Conclusions</a:t>
+            </a:r>
+          </a:p>
+        </p:txBody>
+      </p:sp>
+      <p:sp>
+        <p:nvSpPr>
+          <p:cNvPr id="7" name="Text Placeholder 6"/>
+          <p:cNvSpPr>
+            <a:spLocks noGrp="1"/>
+          </p:cNvSpPr>
+          <p:nvPr>
+            <p:ph type="body" idx="1"/>
+          </p:nvPr>
+        </p:nvSpPr>
+        <p:spPr/>
+        <p:txBody>
+          <a:bodyPr/>
+          <a:lstStyle/>
+          <a:p>
+            <a:endParaRPr lang="en-US"/>
+          </a:p>
+        </p:txBody>
+      </p:sp>
+      <p:sp>
+        <p:nvSpPr>
+          <p:cNvPr id="4" name="Slide Number Placeholder 5">
+            <a:extLst>
+              <a:ext uri="{FF2B5EF4-FFF2-40B4-BE49-F238E27FC236}">
+                <a16:creationId xmlns:a16="http://schemas.microsoft.com/office/drawing/2014/main" id="{10E136A7-23FE-4AEA-AB8B-D10D98BC186B}"/>
+              </a:ext>
+            </a:extLst>
+          </p:cNvPr>
+          <p:cNvSpPr>
+            <a:spLocks noGrp="1"/>
+          </p:cNvSpPr>
+          <p:nvPr>
+            <p:ph type="sldNum" sz="quarter" idx="4"/>
+          </p:nvPr>
+        </p:nvSpPr>
+        <p:spPr>
+          <a:xfrm>
+            <a:off x="5072514" y="6400942"/>
+            <a:ext cx="2133600" cy="365125"/>
+          </a:xfrm>
+          <a:prstGeom prst="rect">
+            <a:avLst/>
+          </a:prstGeom>
+        </p:spPr>
+        <p:txBody>
+          <a:bodyPr vert="horz" lIns="91440" tIns="45720" rIns="91440" bIns="45720" rtlCol="0" anchor="ctr"/>
+          <a:lstStyle>
+            <a:lvl1pPr algn="r">
+              <a:defRPr sz="1400">
+                <a:solidFill>
+                  <a:schemeClr val="bg1"/>
+                </a:solidFill>
+              </a:defRPr>
+            </a:lvl1pPr>
+          </a:lstStyle>
+          <a:p>
+            <a:fld id="{A23448E3-F972-4314-BEF2-440ABE63D998}" type="slidenum">
+              <a:rPr lang="en-US" b="1" smtClean="0">
+                <a:solidFill>
+                  <a:srgbClr val="FFFFFF"/>
+                </a:solidFill>
+              </a:rPr>
+              <a:pPr/>
+              <a:t>53</a:t>
+            </a:fld>
+            <a:endParaRPr lang="en-US" b="1" dirty="0">
+              <a:solidFill>
+                <a:srgbClr val="FFFFFF"/>
+              </a:solidFill>
+            </a:endParaRPr>
+          </a:p>
+        </p:txBody>
+      </p:sp>
+    </p:spTree>
+    <p:extLst>
+      <p:ext uri="{BB962C8B-B14F-4D97-AF65-F5344CB8AC3E}">
+        <p14:creationId xmlns:p14="http://schemas.microsoft.com/office/powerpoint/2010/main" val="3675669823"/>
+      </p:ext>
+    </p:extLst>
+  </p:cSld>
+  <p:clrMapOvr>
+    <a:masterClrMapping/>
+  </p:clrMapOvr>
+</p:sld>
+</file>
+
+<file path=ppt/slides/slide54.xml><?xml version="1.0" encoding="utf-8"?>
+<p:sld xmlns:a="http://schemas.openxmlformats.org/drawingml/2006/main" xmlns:r="http://schemas.openxmlformats.org/officeDocument/2006/relationships" xmlns:p="http://schemas.openxmlformats.org/presentationml/2006/main">
+  <p:cSld>
+    <p:spTree>
+      <p:nvGrpSpPr>
+        <p:cNvPr id="1" name=""/>
+        <p:cNvGrpSpPr/>
+        <p:nvPr/>
+      </p:nvGrpSpPr>
+      <p:grpSpPr>
+        <a:xfrm>
+          <a:off x="0" y="0"/>
+          <a:ext cx="0" cy="0"/>
+          <a:chOff x="0" y="0"/>
+          <a:chExt cx="0" cy="0"/>
+        </a:xfrm>
+      </p:grpSpPr>
+      <p:sp>
+        <p:nvSpPr>
+          <p:cNvPr id="2" name="Title 1">
+            <a:extLst>
+              <a:ext uri="{FF2B5EF4-FFF2-40B4-BE49-F238E27FC236}">
+                <a16:creationId xmlns:a16="http://schemas.microsoft.com/office/drawing/2014/main" id="{8BAFCB3B-FCA3-462A-A303-8BDB171EE8EA}"/>
+              </a:ext>
+            </a:extLst>
+          </p:cNvPr>
+          <p:cNvSpPr>
+            <a:spLocks noGrp="1"/>
+          </p:cNvSpPr>
+          <p:nvPr>
+            <p:ph type="title"/>
+          </p:nvPr>
+        </p:nvSpPr>
+        <p:spPr/>
+        <p:txBody>
+          <a:bodyPr/>
+          <a:lstStyle/>
+          <a:p>
+            <a:r>
+              <a:rPr lang="en-US" dirty="0"/>
+              <a:t>Radio Altimeter Tolerance of WAIC Systems</a:t>
+            </a:r>
+          </a:p>
+        </p:txBody>
+      </p:sp>
+      <p:sp>
+        <p:nvSpPr>
+          <p:cNvPr id="4" name="Text Placeholder 3">
+            <a:extLst>
+              <a:ext uri="{FF2B5EF4-FFF2-40B4-BE49-F238E27FC236}">
+                <a16:creationId xmlns:a16="http://schemas.microsoft.com/office/drawing/2014/main" id="{F662931B-701D-488B-B6AE-5BEDE8A83B51}"/>
+              </a:ext>
+            </a:extLst>
+          </p:cNvPr>
+          <p:cNvSpPr>
+            <a:spLocks noGrp="1"/>
+          </p:cNvSpPr>
+          <p:nvPr>
+            <p:ph type="body" sz="quarter" idx="10"/>
+          </p:nvPr>
+        </p:nvSpPr>
+        <p:spPr/>
+        <p:txBody>
+          <a:bodyPr/>
+          <a:lstStyle/>
+          <a:p>
+            <a:r>
+              <a:rPr lang="en-US" dirty="0"/>
+              <a:t>Conclusions</a:t>
+            </a:r>
+          </a:p>
+        </p:txBody>
+      </p:sp>
+      <p:sp>
+        <p:nvSpPr>
+          <p:cNvPr id="5" name="Text Placeholder 4">
+            <a:extLst>
+              <a:ext uri="{FF2B5EF4-FFF2-40B4-BE49-F238E27FC236}">
+                <a16:creationId xmlns:a16="http://schemas.microsoft.com/office/drawing/2014/main" id="{061DAB52-3E86-4605-8E4F-22B6F84F8088}"/>
+              </a:ext>
+            </a:extLst>
+          </p:cNvPr>
+          <p:cNvSpPr>
+            <a:spLocks noGrp="1"/>
+          </p:cNvSpPr>
+          <p:nvPr>
+            <p:ph type="body" sz="quarter" idx="11"/>
+          </p:nvPr>
+        </p:nvSpPr>
+        <p:spPr/>
+        <p:txBody>
+          <a:bodyPr/>
+          <a:lstStyle/>
+          <a:p>
+            <a:r>
+              <a:rPr lang="en-US" dirty="0"/>
+              <a:t>Results of Test Bed Automation</a:t>
+            </a:r>
+          </a:p>
+        </p:txBody>
+      </p:sp>
+      <p:sp>
+        <p:nvSpPr>
+          <p:cNvPr id="6" name="Slide Number Placeholder 5">
+            <a:extLst>
+              <a:ext uri="{FF2B5EF4-FFF2-40B4-BE49-F238E27FC236}">
+                <a16:creationId xmlns:a16="http://schemas.microsoft.com/office/drawing/2014/main" id="{7A850062-377E-4031-ACE9-CE66F7BE723F}"/>
+              </a:ext>
+            </a:extLst>
+          </p:cNvPr>
+          <p:cNvSpPr>
+            <a:spLocks noGrp="1"/>
+          </p:cNvSpPr>
+          <p:nvPr>
+            <p:ph type="sldNum" sz="quarter" idx="4"/>
+          </p:nvPr>
+        </p:nvSpPr>
+        <p:spPr>
+          <a:xfrm>
+            <a:off x="5072514" y="6400942"/>
+            <a:ext cx="2133600" cy="365125"/>
+          </a:xfrm>
+          <a:prstGeom prst="rect">
+            <a:avLst/>
+          </a:prstGeom>
+        </p:spPr>
+        <p:txBody>
+          <a:bodyPr vert="horz" lIns="91440" tIns="45720" rIns="91440" bIns="45720" rtlCol="0" anchor="ctr"/>
+          <a:lstStyle>
+            <a:lvl1pPr algn="r">
+              <a:defRPr sz="1400">
+                <a:solidFill>
+                  <a:schemeClr val="bg1"/>
+                </a:solidFill>
+              </a:defRPr>
+            </a:lvl1pPr>
+          </a:lstStyle>
+          <a:p>
+            <a:fld id="{A23448E3-F972-4314-BEF2-440ABE63D998}" type="slidenum">
+              <a:rPr lang="en-US" b="1" smtClean="0">
+                <a:solidFill>
+                  <a:srgbClr val="FFFFFF"/>
+                </a:solidFill>
+              </a:rPr>
+              <a:pPr/>
               <a:t>54</a:t>
             </a:fld>
             <a:endParaRPr lang="en-US" b="1" dirty="0">
@@ -18811,29 +18717,75 @@
       </p:sp>
       <p:sp>
         <p:nvSpPr>
-          <p:cNvPr id="13" name="Content Placeholder 12">
-            <a:extLst>
-              <a:ext uri="{FF2B5EF4-FFF2-40B4-BE49-F238E27FC236}">
-                <a16:creationId xmlns:a16="http://schemas.microsoft.com/office/drawing/2014/main" id="{E427AF26-0199-4C36-BEBD-98D0CF434499}"/>
-              </a:ext>
-            </a:extLst>
-          </p:cNvPr>
-          <p:cNvSpPr>
-            <a:spLocks noGrp="1"/>
-          </p:cNvSpPr>
-          <p:nvPr>
-            <p:ph idx="12"/>
+          <p:cNvPr id="10" name="Content Placeholder 9">
+            <a:extLst>
+              <a:ext uri="{FF2B5EF4-FFF2-40B4-BE49-F238E27FC236}">
+                <a16:creationId xmlns:a16="http://schemas.microsoft.com/office/drawing/2014/main" id="{E0965016-AA02-409D-A5F0-F2748B3CB904}"/>
+              </a:ext>
+            </a:extLst>
+          </p:cNvPr>
+          <p:cNvSpPr>
+            <a:spLocks noGrp="1"/>
+          </p:cNvSpPr>
+          <p:nvPr>
+            <p:ph idx="1"/>
           </p:nvPr>
         </p:nvSpPr>
         <p:spPr>
           <a:xfrm>
-            <a:off x="990601" y="3429000"/>
-            <a:ext cx="7467599" cy="2590800"/>
+            <a:off x="457200" y="1701800"/>
+            <a:ext cx="7772400" cy="3886200"/>
           </a:xfrm>
         </p:spPr>
         <p:txBody>
           <a:bodyPr/>
           <a:lstStyle/>
+          <a:p>
+            <a:r>
+              <a:rPr lang="en-US" dirty="0"/>
+              <a:t>Successfully developed a reference test bed validated by RA manufacturers and aircraft manufacturers. </a:t>
+            </a:r>
+          </a:p>
+          <a:p>
+            <a:r>
+              <a:rPr lang="en-US" dirty="0"/>
+              <a:t>Developed automation which enabled testing under a wide range of test conditions</a:t>
+            </a:r>
+          </a:p>
+          <a:p>
+            <a:r>
+              <a:rPr lang="en-US" dirty="0"/>
+              <a:t>Developed reporting formats which supported the development of international standards</a:t>
+            </a:r>
+          </a:p>
+          <a:p>
+            <a:pPr lvl="1"/>
+            <a:r>
+              <a:rPr lang="en-US" dirty="0"/>
+              <a:t>International Civil Aviation Organization Standard and Recommended Practices </a:t>
+            </a:r>
+          </a:p>
+          <a:p>
+            <a:pPr lvl="1"/>
+            <a:r>
+              <a:rPr lang="en-US" dirty="0"/>
+              <a:t>RTCA Inc. Minimum Aviation System Performance Standards </a:t>
+            </a:r>
+          </a:p>
+          <a:p>
+            <a:pPr lvl="1"/>
+            <a:r>
+              <a:rPr lang="en-US" dirty="0"/>
+              <a:t>RTCA Inc. Minimum Operational Performance Standards</a:t>
+            </a:r>
+          </a:p>
+          <a:p>
+            <a:pPr lvl="1"/>
+            <a:endParaRPr lang="en-US" dirty="0"/>
+          </a:p>
+          <a:p>
+            <a:endParaRPr lang="en-US" dirty="0"/>
+          </a:p>
           <a:p>
             <a:endParaRPr lang="en-US" dirty="0"/>
           </a:p>
@@ -18842,7 +18794,7 @@
     </p:spTree>
     <p:extLst>
       <p:ext uri="{BB962C8B-B14F-4D97-AF65-F5344CB8AC3E}">
-        <p14:creationId xmlns:p14="http://schemas.microsoft.com/office/powerpoint/2010/main" val="2975763781"/>
+        <p14:creationId xmlns:p14="http://schemas.microsoft.com/office/powerpoint/2010/main" val="3936979856"/>
       </p:ext>
     </p:extLst>
   </p:cSld>
@@ -18874,7 +18826,13 @@
       </p:grpSpPr>
       <p:sp>
         <p:nvSpPr>
-          <p:cNvPr id="6" name="Title 5"/>
+          <p:cNvPr id="2" name="Title 1">
+            <a:extLst>
+              <a:ext uri="{FF2B5EF4-FFF2-40B4-BE49-F238E27FC236}">
+                <a16:creationId xmlns:a16="http://schemas.microsoft.com/office/drawing/2014/main" id="{E21BEE1A-49DA-48B2-A1BA-E8A2B25B3552}"/>
+              </a:ext>
+            </a:extLst>
+          </p:cNvPr>
           <p:cNvSpPr>
             <a:spLocks noGrp="1"/>
           </p:cNvSpPr>
@@ -18889,36 +18847,61 @@
           <a:p>
             <a:r>
               <a:rPr lang="en-US" dirty="0"/>
-              <a:t>‘Out of Band’ WAIC Test Results</a:t>
-            </a:r>
-          </a:p>
-        </p:txBody>
-      </p:sp>
-      <p:sp>
-        <p:nvSpPr>
-          <p:cNvPr id="7" name="Text Placeholder 6"/>
-          <p:cNvSpPr>
-            <a:spLocks noGrp="1"/>
-          </p:cNvSpPr>
-          <p:nvPr>
-            <p:ph type="body" idx="1"/>
-          </p:nvPr>
-        </p:nvSpPr>
-        <p:spPr/>
-        <p:txBody>
-          <a:bodyPr/>
-          <a:lstStyle/>
-          <a:p>
-            <a:endParaRPr lang="en-US"/>
-          </a:p>
-        </p:txBody>
-      </p:sp>
-      <p:sp>
-        <p:nvSpPr>
-          <p:cNvPr id="4" name="Slide Number Placeholder 5">
-            <a:extLst>
-              <a:ext uri="{FF2B5EF4-FFF2-40B4-BE49-F238E27FC236}">
-                <a16:creationId xmlns:a16="http://schemas.microsoft.com/office/drawing/2014/main" id="{10E136A7-23FE-4AEA-AB8B-D10D98BC186B}"/>
+              <a:t>References</a:t>
+            </a:r>
+          </a:p>
+        </p:txBody>
+      </p:sp>
+      <p:sp>
+        <p:nvSpPr>
+          <p:cNvPr id="3" name="Content Placeholder 2">
+            <a:extLst>
+              <a:ext uri="{FF2B5EF4-FFF2-40B4-BE49-F238E27FC236}">
+                <a16:creationId xmlns:a16="http://schemas.microsoft.com/office/drawing/2014/main" id="{A54A97F6-EDE3-4101-85EA-6F63328E9CCC}"/>
+              </a:ext>
+            </a:extLst>
+          </p:cNvPr>
+          <p:cNvSpPr>
+            <a:spLocks noGrp="1"/>
+          </p:cNvSpPr>
+          <p:nvPr>
+            <p:ph idx="1"/>
+          </p:nvPr>
+        </p:nvSpPr>
+        <p:spPr>
+          <a:xfrm>
+            <a:off x="685800" y="990600"/>
+            <a:ext cx="7772400" cy="5029200"/>
+          </a:xfrm>
+        </p:spPr>
+        <p:txBody>
+          <a:bodyPr/>
+          <a:lstStyle/>
+          <a:p>
+            <a:pPr marL="457200" indent="-457200">
+              <a:buFont typeface="+mj-lt"/>
+              <a:buAutoNum type="arabicPeriod"/>
+            </a:pPr>
+            <a:r>
+              <a:rPr lang="en-US" dirty="0"/>
+              <a:t>“Minimum Performance Standards Airborne Low-Range Radar Altimeters,” Industry Standard DO-155, Radio Technical Commission for Aeronautics, Washington, D.C., Nov. 1974.</a:t>
+            </a:r>
+          </a:p>
+          <a:p>
+            <a:pPr marL="457200" indent="-457200">
+              <a:buFont typeface="+mj-lt"/>
+              <a:buAutoNum type="arabicPeriod"/>
+            </a:pPr>
+            <a:endParaRPr lang="en-US" dirty="0"/>
+          </a:p>
+        </p:txBody>
+      </p:sp>
+      <p:sp>
+        <p:nvSpPr>
+          <p:cNvPr id="6" name="Slide Number Placeholder 5">
+            <a:extLst>
+              <a:ext uri="{FF2B5EF4-FFF2-40B4-BE49-F238E27FC236}">
+                <a16:creationId xmlns:a16="http://schemas.microsoft.com/office/drawing/2014/main" id="{DFBD8214-C84C-4755-BBE6-2B064ABE18D6}"/>
               </a:ext>
             </a:extLst>
           </p:cNvPr>
@@ -18970,7 +18953,7 @@
     </p:spTree>
     <p:extLst>
       <p:ext uri="{BB962C8B-B14F-4D97-AF65-F5344CB8AC3E}">
-        <p14:creationId xmlns:p14="http://schemas.microsoft.com/office/powerpoint/2010/main" val="1606341070"/>
+        <p14:creationId xmlns:p14="http://schemas.microsoft.com/office/powerpoint/2010/main" val="3689123858"/>
       </p:ext>
     </p:extLst>
   </p:cSld>
@@ -18999,13 +18982,7 @@
       </p:grpSpPr>
       <p:sp>
         <p:nvSpPr>
-          <p:cNvPr id="2" name="Title 1">
-            <a:extLst>
-              <a:ext uri="{FF2B5EF4-FFF2-40B4-BE49-F238E27FC236}">
-                <a16:creationId xmlns:a16="http://schemas.microsoft.com/office/drawing/2014/main" id="{8BAFCB3B-FCA3-462A-A303-8BDB171EE8EA}"/>
-              </a:ext>
-            </a:extLst>
-          </p:cNvPr>
+          <p:cNvPr id="6" name="Title 5"/>
           <p:cNvSpPr>
             <a:spLocks noGrp="1"/>
           </p:cNvSpPr>
@@ -19020,25 +18997,19 @@
           <a:p>
             <a:r>
               <a:rPr lang="en-US" dirty="0"/>
-              <a:t>Radio Altimeter Tolerance of WAIC Systems</a:t>
-            </a:r>
-          </a:p>
-        </p:txBody>
-      </p:sp>
-      <p:sp>
-        <p:nvSpPr>
-          <p:cNvPr id="4" name="Text Placeholder 3">
-            <a:extLst>
-              <a:ext uri="{FF2B5EF4-FFF2-40B4-BE49-F238E27FC236}">
-                <a16:creationId xmlns:a16="http://schemas.microsoft.com/office/drawing/2014/main" id="{F662931B-701D-488B-B6AE-5BEDE8A83B51}"/>
-              </a:ext>
-            </a:extLst>
-          </p:cNvPr>
-          <p:cNvSpPr>
-            <a:spLocks noGrp="1"/>
-          </p:cNvSpPr>
-          <p:nvPr>
-            <p:ph type="body" sz="quarter" idx="10"/>
+              <a:t>In Band Results</a:t>
+            </a:r>
+          </a:p>
+        </p:txBody>
+      </p:sp>
+      <p:sp>
+        <p:nvSpPr>
+          <p:cNvPr id="7" name="Text Placeholder 6"/>
+          <p:cNvSpPr>
+            <a:spLocks noGrp="1"/>
+          </p:cNvSpPr>
+          <p:nvPr>
+            <p:ph type="body" idx="1"/>
           </p:nvPr>
         </p:nvSpPr>
         <p:spPr/>
@@ -19046,47 +19017,16 @@
           <a:bodyPr/>
           <a:lstStyle/>
           <a:p>
-            <a:r>
-              <a:rPr lang="en-US" dirty="0"/>
-              <a:t>‘Out of Band’ WAIC Tests</a:t>
-            </a:r>
-          </a:p>
-        </p:txBody>
-      </p:sp>
-      <p:sp>
-        <p:nvSpPr>
-          <p:cNvPr id="5" name="Text Placeholder 4">
-            <a:extLst>
-              <a:ext uri="{FF2B5EF4-FFF2-40B4-BE49-F238E27FC236}">
-                <a16:creationId xmlns:a16="http://schemas.microsoft.com/office/drawing/2014/main" id="{061DAB52-3E86-4605-8E4F-22B6F84F8088}"/>
-              </a:ext>
-            </a:extLst>
-          </p:cNvPr>
-          <p:cNvSpPr>
-            <a:spLocks noGrp="1"/>
-          </p:cNvSpPr>
-          <p:nvPr>
-            <p:ph type="body" sz="quarter" idx="11"/>
-          </p:nvPr>
-        </p:nvSpPr>
-        <p:spPr/>
-        <p:txBody>
-          <a:bodyPr/>
-          <a:lstStyle/>
-          <a:p>
-            <a:r>
-              <a:rPr lang="en-US" dirty="0"/>
-              <a:t>Preliminary results here</a:t>
-            </a:r>
-          </a:p>
-        </p:txBody>
-      </p:sp>
-      <p:sp>
-        <p:nvSpPr>
-          <p:cNvPr id="6" name="Slide Number Placeholder 5">
-            <a:extLst>
-              <a:ext uri="{FF2B5EF4-FFF2-40B4-BE49-F238E27FC236}">
-                <a16:creationId xmlns:a16="http://schemas.microsoft.com/office/drawing/2014/main" id="{7A850062-377E-4031-ACE9-CE66F7BE723F}"/>
+            <a:endParaRPr lang="en-US"/>
+          </a:p>
+        </p:txBody>
+      </p:sp>
+      <p:sp>
+        <p:nvSpPr>
+          <p:cNvPr id="4" name="Slide Number Placeholder 5">
+            <a:extLst>
+              <a:ext uri="{FF2B5EF4-FFF2-40B4-BE49-F238E27FC236}">
+                <a16:creationId xmlns:a16="http://schemas.microsoft.com/office/drawing/2014/main" id="{10E136A7-23FE-4AEA-AB8B-D10D98BC186B}"/>
               </a:ext>
             </a:extLst>
           </p:cNvPr>
@@ -19135,44 +19075,16 @@
           </a:p>
         </p:txBody>
       </p:sp>
-      <p:sp>
-        <p:nvSpPr>
-          <p:cNvPr id="10" name="Content Placeholder 9">
-            <a:extLst>
-              <a:ext uri="{FF2B5EF4-FFF2-40B4-BE49-F238E27FC236}">
-                <a16:creationId xmlns:a16="http://schemas.microsoft.com/office/drawing/2014/main" id="{E0965016-AA02-409D-A5F0-F2748B3CB904}"/>
-              </a:ext>
-            </a:extLst>
-          </p:cNvPr>
-          <p:cNvSpPr>
-            <a:spLocks noGrp="1"/>
-          </p:cNvSpPr>
-          <p:nvPr>
-            <p:ph idx="1"/>
-          </p:nvPr>
-        </p:nvSpPr>
-        <p:spPr/>
-        <p:txBody>
-          <a:bodyPr/>
-          <a:lstStyle/>
-          <a:p>
-            <a:endParaRPr lang="en-US" dirty="0"/>
-          </a:p>
-        </p:txBody>
-      </p:sp>
     </p:spTree>
     <p:extLst>
       <p:ext uri="{BB962C8B-B14F-4D97-AF65-F5344CB8AC3E}">
-        <p14:creationId xmlns:p14="http://schemas.microsoft.com/office/powerpoint/2010/main" val="1025219883"/>
+        <p14:creationId xmlns:p14="http://schemas.microsoft.com/office/powerpoint/2010/main" val="1656932729"/>
       </p:ext>
     </p:extLst>
   </p:cSld>
   <p:clrMapOvr>
     <a:masterClrMapping/>
   </p:clrMapOvr>
-  <p:transition>
-    <p:fade/>
-  </p:transition>
 </p:sld>
 </file>
 
@@ -19195,7 +19107,13 @@
       </p:grpSpPr>
       <p:sp>
         <p:nvSpPr>
-          <p:cNvPr id="6" name="Title 5"/>
+          <p:cNvPr id="2" name="Title 1">
+            <a:extLst>
+              <a:ext uri="{FF2B5EF4-FFF2-40B4-BE49-F238E27FC236}">
+                <a16:creationId xmlns:a16="http://schemas.microsoft.com/office/drawing/2014/main" id="{8BAFCB3B-FCA3-462A-A303-8BDB171EE8EA}"/>
+              </a:ext>
+            </a:extLst>
+          </p:cNvPr>
           <p:cNvSpPr>
             <a:spLocks noGrp="1"/>
           </p:cNvSpPr>
@@ -19210,19 +19128,25 @@
           <a:p>
             <a:r>
               <a:rPr lang="en-US" dirty="0"/>
-              <a:t>Conclusions</a:t>
-            </a:r>
-          </a:p>
-        </p:txBody>
-      </p:sp>
-      <p:sp>
-        <p:nvSpPr>
-          <p:cNvPr id="7" name="Text Placeholder 6"/>
-          <p:cNvSpPr>
-            <a:spLocks noGrp="1"/>
-          </p:cNvSpPr>
-          <p:nvPr>
-            <p:ph type="body" idx="1"/>
+              <a:t>Radio Altimeter Tolerance of WAIC Systems</a:t>
+            </a:r>
+          </a:p>
+        </p:txBody>
+      </p:sp>
+      <p:sp>
+        <p:nvSpPr>
+          <p:cNvPr id="4" name="Text Placeholder 3">
+            <a:extLst>
+              <a:ext uri="{FF2B5EF4-FFF2-40B4-BE49-F238E27FC236}">
+                <a16:creationId xmlns:a16="http://schemas.microsoft.com/office/drawing/2014/main" id="{F662931B-701D-488B-B6AE-5BEDE8A83B51}"/>
+              </a:ext>
+            </a:extLst>
+          </p:cNvPr>
+          <p:cNvSpPr>
+            <a:spLocks noGrp="1"/>
+          </p:cNvSpPr>
+          <p:nvPr>
+            <p:ph type="body" sz="quarter" idx="10"/>
           </p:nvPr>
         </p:nvSpPr>
         <p:spPr/>
@@ -19230,16 +19154,47 @@
           <a:bodyPr/>
           <a:lstStyle/>
           <a:p>
-            <a:endParaRPr lang="en-US"/>
-          </a:p>
-        </p:txBody>
-      </p:sp>
-      <p:sp>
-        <p:nvSpPr>
-          <p:cNvPr id="4" name="Slide Number Placeholder 5">
-            <a:extLst>
-              <a:ext uri="{FF2B5EF4-FFF2-40B4-BE49-F238E27FC236}">
-                <a16:creationId xmlns:a16="http://schemas.microsoft.com/office/drawing/2014/main" id="{10E136A7-23FE-4AEA-AB8B-D10D98BC186B}"/>
+            <a:r>
+              <a:rPr lang="en-US" dirty="0"/>
+              <a:t>‘In Band’ WAIC Tests</a:t>
+            </a:r>
+          </a:p>
+        </p:txBody>
+      </p:sp>
+      <p:sp>
+        <p:nvSpPr>
+          <p:cNvPr id="5" name="Text Placeholder 4">
+            <a:extLst>
+              <a:ext uri="{FF2B5EF4-FFF2-40B4-BE49-F238E27FC236}">
+                <a16:creationId xmlns:a16="http://schemas.microsoft.com/office/drawing/2014/main" id="{061DAB52-3E86-4605-8E4F-22B6F84F8088}"/>
+              </a:ext>
+            </a:extLst>
+          </p:cNvPr>
+          <p:cNvSpPr>
+            <a:spLocks noGrp="1"/>
+          </p:cNvSpPr>
+          <p:nvPr>
+            <p:ph type="body" sz="quarter" idx="11"/>
+          </p:nvPr>
+        </p:nvSpPr>
+        <p:spPr/>
+        <p:txBody>
+          <a:bodyPr/>
+          <a:lstStyle/>
+          <a:p>
+            <a:r>
+              <a:rPr lang="en-US" dirty="0"/>
+              <a:t>Results – RA Type 1</a:t>
+            </a:r>
+          </a:p>
+        </p:txBody>
+      </p:sp>
+      <p:sp>
+        <p:nvSpPr>
+          <p:cNvPr id="6" name="Slide Number Placeholder 5">
+            <a:extLst>
+              <a:ext uri="{FF2B5EF4-FFF2-40B4-BE49-F238E27FC236}">
+                <a16:creationId xmlns:a16="http://schemas.microsoft.com/office/drawing/2014/main" id="{7A850062-377E-4031-ACE9-CE66F7BE723F}"/>
               </a:ext>
             </a:extLst>
           </p:cNvPr>
@@ -19288,16 +19243,60 @@
           </a:p>
         </p:txBody>
       </p:sp>
+      <p:pic>
+        <p:nvPicPr>
+          <p:cNvPr id="8" name="Content Placeholder 7" descr="https://members.avsi.aero/projects/AFE76s1/labtest/ERT%20530%20500%20ft/100dB%20VCO%20200MHz%20Long%20Power%202nd%20waveform/Stat%20Plot%20200%20MHz%20OFDM%20paper.png">
+            <a:extLst>
+              <a:ext uri="{FF2B5EF4-FFF2-40B4-BE49-F238E27FC236}">
+                <a16:creationId xmlns:a16="http://schemas.microsoft.com/office/drawing/2014/main" id="{C1CB8BDD-9374-4A96-8463-1668F721416C}"/>
+              </a:ext>
+            </a:extLst>
+          </p:cNvPr>
+          <p:cNvPicPr>
+            <a:picLocks noGrp="1"/>
+          </p:cNvPicPr>
+          <p:nvPr>
+            <p:ph idx="1"/>
+          </p:nvPr>
+        </p:nvPicPr>
+        <p:blipFill rotWithShape="1">
+          <a:blip r:embed="rId2" cstate="print">
+            <a:extLst>
+              <a:ext uri="{28A0092B-C50C-407E-A947-70E740481C1C}">
+                <a14:useLocalDpi xmlns:a14="http://schemas.microsoft.com/office/drawing/2010/main" val="0"/>
+              </a:ext>
+            </a:extLst>
+          </a:blip>
+          <a:srcRect l="7170" t="10441" r="7986" b="4783"/>
+          <a:stretch/>
+        </p:blipFill>
+        <p:spPr bwMode="auto">
+          <a:xfrm>
+            <a:off x="1066800" y="1642055"/>
+            <a:ext cx="6705601" cy="4627810"/>
+          </a:xfrm>
+          <a:prstGeom prst="rect">
+            <a:avLst/>
+          </a:prstGeom>
+          <a:noFill/>
+          <a:ln>
+            <a:noFill/>
+          </a:ln>
+        </p:spPr>
+      </p:pic>
     </p:spTree>
     <p:extLst>
       <p:ext uri="{BB962C8B-B14F-4D97-AF65-F5344CB8AC3E}">
-        <p14:creationId xmlns:p14="http://schemas.microsoft.com/office/powerpoint/2010/main" val="3675669823"/>
+        <p14:creationId xmlns:p14="http://schemas.microsoft.com/office/powerpoint/2010/main" val="4058572010"/>
       </p:ext>
     </p:extLst>
   </p:cSld>
   <p:clrMapOvr>
     <a:masterClrMapping/>
   </p:clrMapOvr>
+  <p:transition>
+    <p:fade/>
+  </p:transition>
 </p:sld>
 </file>
 
@@ -19369,7 +19368,7 @@
           <a:p>
             <a:r>
               <a:rPr lang="en-US" dirty="0"/>
-              <a:t>Conclusions</a:t>
+              <a:t>‘In Band’ WAIC Tests</a:t>
             </a:r>
           </a:p>
         </p:txBody>
@@ -19397,7 +19396,7 @@
           <a:p>
             <a:r>
               <a:rPr lang="en-US" dirty="0"/>
-              <a:t>Results of Test Bed Automation</a:t>
+              <a:t>Results – RA Type 2</a:t>
             </a:r>
           </a:p>
         </p:txBody>
@@ -19456,86 +19455,51 @@
           </a:p>
         </p:txBody>
       </p:sp>
-      <p:sp>
-        <p:nvSpPr>
-          <p:cNvPr id="10" name="Content Placeholder 9">
-            <a:extLst>
-              <a:ext uri="{FF2B5EF4-FFF2-40B4-BE49-F238E27FC236}">
-                <a16:creationId xmlns:a16="http://schemas.microsoft.com/office/drawing/2014/main" id="{E0965016-AA02-409D-A5F0-F2748B3CB904}"/>
-              </a:ext>
-            </a:extLst>
-          </p:cNvPr>
-          <p:cNvSpPr>
-            <a:spLocks noGrp="1"/>
-          </p:cNvSpPr>
+      <p:pic>
+        <p:nvPicPr>
+          <p:cNvPr id="9" name="Content Placeholder 8" descr="https://members.avsi.aero/projects/AFE76s1/labtest/ERT%20550%20500%20ft/100dB%20VCO%20200MHz%20Long%20Power%202nd%20Waveform/Stat%20Plot%20200%20MHz%20OFDM%20Paper.png">
+            <a:extLst>
+              <a:ext uri="{FF2B5EF4-FFF2-40B4-BE49-F238E27FC236}">
+                <a16:creationId xmlns:a16="http://schemas.microsoft.com/office/drawing/2014/main" id="{C91BDB8A-9ABC-4AB2-BD17-3ADB646EB2D8}"/>
+              </a:ext>
+            </a:extLst>
+          </p:cNvPr>
+          <p:cNvPicPr>
+            <a:picLocks noGrp="1"/>
+          </p:cNvPicPr>
           <p:nvPr>
             <p:ph idx="1"/>
           </p:nvPr>
-        </p:nvSpPr>
-        <p:spPr>
+        </p:nvPicPr>
+        <p:blipFill rotWithShape="1">
+          <a:blip r:embed="rId2" cstate="print">
+            <a:extLst>
+              <a:ext uri="{28A0092B-C50C-407E-A947-70E740481C1C}">
+                <a14:useLocalDpi xmlns:a14="http://schemas.microsoft.com/office/drawing/2010/main" val="0"/>
+              </a:ext>
+            </a:extLst>
+          </a:blip>
+          <a:srcRect l="6953" t="8091" r="6952" b="3793"/>
+          <a:stretch/>
+        </p:blipFill>
+        <p:spPr bwMode="auto">
           <a:xfrm>
-            <a:off x="457200" y="1701800"/>
-            <a:ext cx="7772400" cy="3886200"/>
+            <a:off x="1257300" y="1621221"/>
+            <a:ext cx="6629400" cy="4686300"/>
           </a:xfrm>
+          <a:prstGeom prst="rect">
+            <a:avLst/>
+          </a:prstGeom>
+          <a:noFill/>
+          <a:ln>
+            <a:noFill/>
+          </a:ln>
         </p:spPr>
-        <p:txBody>
-          <a:bodyPr/>
-          <a:lstStyle/>
-          <a:p>
-            <a:r>
-              <a:rPr lang="en-US" dirty="0"/>
-              <a:t>Successfully developed a reference test bed validated by RA manufacturers and aircraft manufacturers. </a:t>
-            </a:r>
-          </a:p>
-          <a:p>
-            <a:r>
-              <a:rPr lang="en-US" dirty="0"/>
-              <a:t>Developed automation which enabled testing under a wide range of test conditions</a:t>
-            </a:r>
-          </a:p>
-          <a:p>
-            <a:r>
-              <a:rPr lang="en-US" dirty="0"/>
-              <a:t>Developed reporting formats which supported the development of international standards</a:t>
-            </a:r>
-          </a:p>
-          <a:p>
-            <a:pPr lvl="1"/>
-            <a:r>
-              <a:rPr lang="en-US" dirty="0"/>
-              <a:t>International Civil Aviation Organization Standard and Recommended Practices </a:t>
-            </a:r>
-          </a:p>
-          <a:p>
-            <a:pPr lvl="1"/>
-            <a:r>
-              <a:rPr lang="en-US" dirty="0"/>
-              <a:t>RTCA Inc. Minimum Aviation System Performance Standards </a:t>
-            </a:r>
-          </a:p>
-          <a:p>
-            <a:pPr lvl="1"/>
-            <a:r>
-              <a:rPr lang="en-US" dirty="0"/>
-              <a:t>RTCA Inc. Minimum Operational Performance Standards</a:t>
-            </a:r>
-          </a:p>
-          <a:p>
-            <a:pPr lvl="1"/>
-            <a:endParaRPr lang="en-US" dirty="0"/>
-          </a:p>
-          <a:p>
-            <a:endParaRPr lang="en-US" dirty="0"/>
-          </a:p>
-          <a:p>
-            <a:endParaRPr lang="en-US" dirty="0"/>
-          </a:p>
-        </p:txBody>
-      </p:sp>
+      </p:pic>
     </p:spTree>
     <p:extLst>
       <p:ext uri="{BB962C8B-B14F-4D97-AF65-F5344CB8AC3E}">
-        <p14:creationId xmlns:p14="http://schemas.microsoft.com/office/powerpoint/2010/main" val="3936979856"/>
+        <p14:creationId xmlns:p14="http://schemas.microsoft.com/office/powerpoint/2010/main" val="3647468134"/>
       </p:ext>
     </p:extLst>
   </p:cSld>
@@ -19570,7 +19534,7 @@
           <p:cNvPr id="2" name="Title 1">
             <a:extLst>
               <a:ext uri="{FF2B5EF4-FFF2-40B4-BE49-F238E27FC236}">
-                <a16:creationId xmlns:a16="http://schemas.microsoft.com/office/drawing/2014/main" id="{E21BEE1A-49DA-48B2-A1BA-E8A2B25B3552}"/>
+                <a16:creationId xmlns:a16="http://schemas.microsoft.com/office/drawing/2014/main" id="{8BAFCB3B-FCA3-462A-A303-8BDB171EE8EA}"/>
               </a:ext>
             </a:extLst>
           </p:cNvPr>
@@ -19588,70 +19552,64 @@
           <a:p>
             <a:r>
               <a:rPr lang="en-US" dirty="0"/>
-              <a:t>References</a:t>
-            </a:r>
-          </a:p>
-        </p:txBody>
-      </p:sp>
-      <p:sp>
-        <p:nvSpPr>
-          <p:cNvPr id="3" name="Content Placeholder 2">
-            <a:extLst>
-              <a:ext uri="{FF2B5EF4-FFF2-40B4-BE49-F238E27FC236}">
-                <a16:creationId xmlns:a16="http://schemas.microsoft.com/office/drawing/2014/main" id="{A54A97F6-EDE3-4101-85EA-6F63328E9CCC}"/>
-              </a:ext>
-            </a:extLst>
-          </p:cNvPr>
-          <p:cNvSpPr>
-            <a:spLocks noGrp="1"/>
-          </p:cNvSpPr>
-          <p:nvPr>
-            <p:ph idx="1"/>
-          </p:nvPr>
-        </p:nvSpPr>
-        <p:spPr>
-          <a:xfrm>
-            <a:off x="685800" y="990600"/>
-            <a:ext cx="7772400" cy="5029200"/>
-          </a:xfrm>
-        </p:spPr>
-        <p:txBody>
-          <a:bodyPr/>
-          <a:lstStyle/>
-          <a:p>
-            <a:pPr marL="457200" indent="-457200">
-              <a:buFont typeface="+mj-lt"/>
-              <a:buAutoNum type="arabicPeriod"/>
-            </a:pPr>
-            <a:r>
-              <a:rPr lang="en-US" dirty="0"/>
-              <a:t>“Minimum Performance Standards Airborne Low-Range Radar Altimeters,” Industry Standard DO-155, Radio Technical Commission for Aeronautics, Washington, D.C., Nov. 1974.</a:t>
-            </a:r>
-          </a:p>
-          <a:p>
-            <a:pPr marL="457200" indent="-457200">
-              <a:buFont typeface="+mj-lt"/>
-              <a:buAutoNum type="arabicPeriod"/>
-            </a:pPr>
-            <a:r>
-              <a:rPr lang="en-US" dirty="0"/>
-              <a:t>“Compatibility Analysis Between Wireless Avionics Intra-Communication Systems and Systems in the Existing Services in the Frequency Band 4 200-4 400 MHz,” ITU </a:t>
-            </a:r>
-            <a:r>
-              <a:rPr lang="en-US" dirty="0" err="1"/>
-              <a:t>Reccomendation</a:t>
-            </a:r>
-            <a:r>
-              <a:rPr lang="en-US" dirty="0"/>
-              <a:t> ITU-R M.2319-0, International Telecommunication Union, Geneva, Switzerland, Nov. 2014.</a:t>
-            </a:r>
-          </a:p>
-          <a:p>
-            <a:pPr marL="457200" indent="-457200">
-              <a:buFont typeface="+mj-lt"/>
-              <a:buAutoNum type="arabicPeriod"/>
-            </a:pPr>
-            <a:endParaRPr lang="en-US" dirty="0"/>
+              <a:t>Radio Altimeter Tolerance of WAIC Systems</a:t>
+            </a:r>
+          </a:p>
+        </p:txBody>
+      </p:sp>
+      <p:sp>
+        <p:nvSpPr>
+          <p:cNvPr id="4" name="Text Placeholder 3">
+            <a:extLst>
+              <a:ext uri="{FF2B5EF4-FFF2-40B4-BE49-F238E27FC236}">
+                <a16:creationId xmlns:a16="http://schemas.microsoft.com/office/drawing/2014/main" id="{F662931B-701D-488B-B6AE-5BEDE8A83B51}"/>
+              </a:ext>
+            </a:extLst>
+          </p:cNvPr>
+          <p:cNvSpPr>
+            <a:spLocks noGrp="1"/>
+          </p:cNvSpPr>
+          <p:nvPr>
+            <p:ph type="body" sz="quarter" idx="10"/>
+          </p:nvPr>
+        </p:nvSpPr>
+        <p:spPr/>
+        <p:txBody>
+          <a:bodyPr/>
+          <a:lstStyle/>
+          <a:p>
+            <a:r>
+              <a:rPr lang="en-US" dirty="0"/>
+              <a:t>‘In Band’ WAIC Tests</a:t>
+            </a:r>
+          </a:p>
+        </p:txBody>
+      </p:sp>
+      <p:sp>
+        <p:nvSpPr>
+          <p:cNvPr id="5" name="Text Placeholder 4">
+            <a:extLst>
+              <a:ext uri="{FF2B5EF4-FFF2-40B4-BE49-F238E27FC236}">
+                <a16:creationId xmlns:a16="http://schemas.microsoft.com/office/drawing/2014/main" id="{061DAB52-3E86-4605-8E4F-22B6F84F8088}"/>
+              </a:ext>
+            </a:extLst>
+          </p:cNvPr>
+          <p:cNvSpPr>
+            <a:spLocks noGrp="1"/>
+          </p:cNvSpPr>
+          <p:nvPr>
+            <p:ph type="body" sz="quarter" idx="11"/>
+          </p:nvPr>
+        </p:nvSpPr>
+        <p:spPr/>
+        <p:txBody>
+          <a:bodyPr/>
+          <a:lstStyle/>
+          <a:p>
+            <a:r>
+              <a:rPr lang="en-US" dirty="0"/>
+              <a:t>Results – RA Type 3</a:t>
+            </a:r>
           </a:p>
         </p:txBody>
       </p:sp>
@@ -19660,7 +19618,7 @@
           <p:cNvPr id="6" name="Slide Number Placeholder 5">
             <a:extLst>
               <a:ext uri="{FF2B5EF4-FFF2-40B4-BE49-F238E27FC236}">
-                <a16:creationId xmlns:a16="http://schemas.microsoft.com/office/drawing/2014/main" id="{DFBD8214-C84C-4755-BBE6-2B064ABE18D6}"/>
+                <a16:creationId xmlns:a16="http://schemas.microsoft.com/office/drawing/2014/main" id="{7A850062-377E-4031-ACE9-CE66F7BE723F}"/>
               </a:ext>
             </a:extLst>
           </p:cNvPr>
@@ -19709,16 +19667,60 @@
           </a:p>
         </p:txBody>
       </p:sp>
+      <p:pic>
+        <p:nvPicPr>
+          <p:cNvPr id="10" name="Content Placeholder 9" descr="https://members.avsi.aero/projects/AFE76s1/labtest/LRA%20900%20500%20ft/100dB%20VCO%20200MHz%20Long%20Power%202nd%20waveform/Stat%20Plot%20200%20MHz%20OFDM%20paper.png">
+            <a:extLst>
+              <a:ext uri="{FF2B5EF4-FFF2-40B4-BE49-F238E27FC236}">
+                <a16:creationId xmlns:a16="http://schemas.microsoft.com/office/drawing/2014/main" id="{CCC76699-6EEF-414A-8CBC-38C3570468A4}"/>
+              </a:ext>
+            </a:extLst>
+          </p:cNvPr>
+          <p:cNvPicPr>
+            <a:picLocks noGrp="1"/>
+          </p:cNvPicPr>
+          <p:nvPr>
+            <p:ph idx="1"/>
+          </p:nvPr>
+        </p:nvPicPr>
+        <p:blipFill rotWithShape="1">
+          <a:blip r:embed="rId2" cstate="print">
+            <a:extLst>
+              <a:ext uri="{28A0092B-C50C-407E-A947-70E740481C1C}">
+                <a14:useLocalDpi xmlns:a14="http://schemas.microsoft.com/office/drawing/2010/main" val="0"/>
+              </a:ext>
+            </a:extLst>
+          </a:blip>
+          <a:srcRect l="6953" t="10240" r="8437" b="3792"/>
+          <a:stretch/>
+        </p:blipFill>
+        <p:spPr bwMode="auto">
+          <a:xfrm>
+            <a:off x="1219200" y="1597525"/>
+            <a:ext cx="6705600" cy="4705685"/>
+          </a:xfrm>
+          <a:prstGeom prst="rect">
+            <a:avLst/>
+          </a:prstGeom>
+          <a:noFill/>
+          <a:ln>
+            <a:noFill/>
+          </a:ln>
+        </p:spPr>
+      </p:pic>
     </p:spTree>
     <p:extLst>
       <p:ext uri="{BB962C8B-B14F-4D97-AF65-F5344CB8AC3E}">
-        <p14:creationId xmlns:p14="http://schemas.microsoft.com/office/powerpoint/2010/main" val="3689123858"/>
+        <p14:creationId xmlns:p14="http://schemas.microsoft.com/office/powerpoint/2010/main" val="1480663454"/>
       </p:ext>
     </p:extLst>
   </p:cSld>
   <p:clrMapOvr>
     <a:masterClrMapping/>
   </p:clrMapOvr>
+  <p:transition>
+    <p:fade/>
+  </p:transition>
 </p:sld>
 </file>
 
@@ -19843,7 +19845,7 @@
           <a:p>
             <a:r>
               <a:rPr lang="en-US" dirty="0"/>
-              <a:t>Project Goals</a:t>
+              <a:t>Project Goals </a:t>
             </a:r>
           </a:p>
         </p:txBody>
@@ -19902,6 +19904,218 @@
     <p:extLst>
       <p:ext uri="{BB962C8B-B14F-4D97-AF65-F5344CB8AC3E}">
         <p14:creationId xmlns:p14="http://schemas.microsoft.com/office/powerpoint/2010/main" val="1742997337"/>
+      </p:ext>
+    </p:extLst>
+  </p:cSld>
+  <p:clrMapOvr>
+    <a:masterClrMapping/>
+  </p:clrMapOvr>
+  <p:transition>
+    <p:fade/>
+  </p:transition>
+</p:sld>
+</file>
+
+<file path=ppt/slides/slide60.xml><?xml version="1.0" encoding="utf-8"?>
+<p:sld xmlns:a="http://schemas.openxmlformats.org/drawingml/2006/main" xmlns:r="http://schemas.openxmlformats.org/officeDocument/2006/relationships" xmlns:p="http://schemas.openxmlformats.org/presentationml/2006/main">
+  <p:cSld>
+    <p:spTree>
+      <p:nvGrpSpPr>
+        <p:cNvPr id="1" name=""/>
+        <p:cNvGrpSpPr/>
+        <p:nvPr/>
+      </p:nvGrpSpPr>
+      <p:grpSpPr>
+        <a:xfrm>
+          <a:off x="0" y="0"/>
+          <a:ext cx="0" cy="0"/>
+          <a:chOff x="0" y="0"/>
+          <a:chExt cx="0" cy="0"/>
+        </a:xfrm>
+      </p:grpSpPr>
+      <p:sp>
+        <p:nvSpPr>
+          <p:cNvPr id="2" name="Title 1">
+            <a:extLst>
+              <a:ext uri="{FF2B5EF4-FFF2-40B4-BE49-F238E27FC236}">
+                <a16:creationId xmlns:a16="http://schemas.microsoft.com/office/drawing/2014/main" id="{8BAFCB3B-FCA3-462A-A303-8BDB171EE8EA}"/>
+              </a:ext>
+            </a:extLst>
+          </p:cNvPr>
+          <p:cNvSpPr>
+            <a:spLocks noGrp="1"/>
+          </p:cNvSpPr>
+          <p:nvPr>
+            <p:ph type="title"/>
+          </p:nvPr>
+        </p:nvSpPr>
+        <p:spPr/>
+        <p:txBody>
+          <a:bodyPr/>
+          <a:lstStyle/>
+          <a:p>
+            <a:r>
+              <a:rPr lang="en-US" dirty="0"/>
+              <a:t>Radio Altimeter Tolerance of WAIC Systems</a:t>
+            </a:r>
+          </a:p>
+        </p:txBody>
+      </p:sp>
+      <p:sp>
+        <p:nvSpPr>
+          <p:cNvPr id="4" name="Text Placeholder 3">
+            <a:extLst>
+              <a:ext uri="{FF2B5EF4-FFF2-40B4-BE49-F238E27FC236}">
+                <a16:creationId xmlns:a16="http://schemas.microsoft.com/office/drawing/2014/main" id="{F662931B-701D-488B-B6AE-5BEDE8A83B51}"/>
+              </a:ext>
+            </a:extLst>
+          </p:cNvPr>
+          <p:cNvSpPr>
+            <a:spLocks noGrp="1"/>
+          </p:cNvSpPr>
+          <p:nvPr>
+            <p:ph type="body" sz="quarter" idx="10"/>
+          </p:nvPr>
+        </p:nvSpPr>
+        <p:spPr/>
+        <p:txBody>
+          <a:bodyPr/>
+          <a:lstStyle/>
+          <a:p>
+            <a:r>
+              <a:rPr lang="en-US" dirty="0"/>
+              <a:t>‘In Band’ WAIC Tests</a:t>
+            </a:r>
+          </a:p>
+        </p:txBody>
+      </p:sp>
+      <p:sp>
+        <p:nvSpPr>
+          <p:cNvPr id="5" name="Text Placeholder 4">
+            <a:extLst>
+              <a:ext uri="{FF2B5EF4-FFF2-40B4-BE49-F238E27FC236}">
+                <a16:creationId xmlns:a16="http://schemas.microsoft.com/office/drawing/2014/main" id="{061DAB52-3E86-4605-8E4F-22B6F84F8088}"/>
+              </a:ext>
+            </a:extLst>
+          </p:cNvPr>
+          <p:cNvSpPr>
+            <a:spLocks noGrp="1"/>
+          </p:cNvSpPr>
+          <p:nvPr>
+            <p:ph type="body" sz="quarter" idx="11"/>
+          </p:nvPr>
+        </p:nvSpPr>
+        <p:spPr/>
+        <p:txBody>
+          <a:bodyPr/>
+          <a:lstStyle/>
+          <a:p>
+            <a:r>
+              <a:rPr lang="en-US" dirty="0"/>
+              <a:t>Results – RA Type 5</a:t>
+            </a:r>
+          </a:p>
+        </p:txBody>
+      </p:sp>
+      <p:sp>
+        <p:nvSpPr>
+          <p:cNvPr id="6" name="Slide Number Placeholder 5">
+            <a:extLst>
+              <a:ext uri="{FF2B5EF4-FFF2-40B4-BE49-F238E27FC236}">
+                <a16:creationId xmlns:a16="http://schemas.microsoft.com/office/drawing/2014/main" id="{7A850062-377E-4031-ACE9-CE66F7BE723F}"/>
+              </a:ext>
+            </a:extLst>
+          </p:cNvPr>
+          <p:cNvSpPr>
+            <a:spLocks noGrp="1"/>
+          </p:cNvSpPr>
+          <p:nvPr>
+            <p:ph type="sldNum" sz="quarter" idx="4"/>
+          </p:nvPr>
+        </p:nvSpPr>
+        <p:spPr>
+          <a:xfrm>
+            <a:off x="5072514" y="6400942"/>
+            <a:ext cx="2133600" cy="365125"/>
+          </a:xfrm>
+          <a:prstGeom prst="rect">
+            <a:avLst/>
+          </a:prstGeom>
+        </p:spPr>
+        <p:txBody>
+          <a:bodyPr vert="horz" lIns="91440" tIns="45720" rIns="91440" bIns="45720" rtlCol="0" anchor="ctr"/>
+          <a:lstStyle>
+            <a:lvl1pPr algn="r">
+              <a:defRPr sz="1400">
+                <a:solidFill>
+                  <a:schemeClr val="bg1"/>
+                </a:solidFill>
+              </a:defRPr>
+            </a:lvl1pPr>
+          </a:lstStyle>
+          <a:p>
+            <a:fld id="{A23448E3-F972-4314-BEF2-440ABE63D998}" type="slidenum">
+              <a:rPr lang="en-US" b="1" smtClean="0">
+                <a:solidFill>
+                  <a:srgbClr val="FFFFFF"/>
+                </a:solidFill>
+              </a:rPr>
+              <a:pPr/>
+              <a:t>60</a:t>
+            </a:fld>
+            <a:endParaRPr lang="en-US" b="1" dirty="0">
+              <a:solidFill>
+                <a:srgbClr val="FFFFFF"/>
+              </a:solidFill>
+            </a:endParaRPr>
+          </a:p>
+        </p:txBody>
+      </p:sp>
+      <p:pic>
+        <p:nvPicPr>
+          <p:cNvPr id="8" name="Content Placeholder 7" descr="https://members.avsi.aero/projects/AFE76s1/labtest/ALA%2052B%20500%20ft/100dB%20VCO%20200MHz%20Long%20Power%202nd%20waveform/Stat%20Plot%20200%20MHz%20OFDM%20paper.png">
+            <a:extLst>
+              <a:ext uri="{FF2B5EF4-FFF2-40B4-BE49-F238E27FC236}">
+                <a16:creationId xmlns:a16="http://schemas.microsoft.com/office/drawing/2014/main" id="{210D798C-3637-455B-8E10-9F58DB54C30F}"/>
+              </a:ext>
+            </a:extLst>
+          </p:cNvPr>
+          <p:cNvPicPr>
+            <a:picLocks noGrp="1"/>
+          </p:cNvPicPr>
+          <p:nvPr>
+            <p:ph idx="1"/>
+          </p:nvPr>
+        </p:nvPicPr>
+        <p:blipFill rotWithShape="1">
+          <a:blip r:embed="rId2" cstate="print">
+            <a:extLst>
+              <a:ext uri="{28A0092B-C50C-407E-A947-70E740481C1C}">
+                <a14:useLocalDpi xmlns:a14="http://schemas.microsoft.com/office/drawing/2010/main" val="0"/>
+              </a:ext>
+            </a:extLst>
+          </a:blip>
+          <a:srcRect l="6953" t="10240" r="6953" b="3792"/>
+          <a:stretch/>
+        </p:blipFill>
+        <p:spPr bwMode="auto">
+          <a:xfrm>
+            <a:off x="1181100" y="1668517"/>
+            <a:ext cx="6781800" cy="4677104"/>
+          </a:xfrm>
+          <a:prstGeom prst="rect">
+            <a:avLst/>
+          </a:prstGeom>
+          <a:noFill/>
+          <a:ln>
+            <a:noFill/>
+          </a:ln>
+        </p:spPr>
+      </p:pic>
+    </p:spTree>
+    <p:extLst>
+      <p:ext uri="{BB962C8B-B14F-4D97-AF65-F5344CB8AC3E}">
+        <p14:creationId xmlns:p14="http://schemas.microsoft.com/office/powerpoint/2010/main" val="1913628093"/>
       </p:ext>
     </p:extLst>
   </p:cSld>

</xml_diff>